<commit_message>
Final update before presentation
Đã hoàn thành tất cả các chức năng trừ phần tên đăng nhập và chức danh
của nhân viên (cái này đang làm dở). Phần báo cáo tương đối đơn giản,
hạn chế màu mè. Không biết có ai đọc cái này k nữa...
</commit_message>
<xml_diff>
--- a/Báo cáo/Báo cáo.pptx
+++ b/Báo cáo/Báo cáo.pptx
@@ -5,10 +5,10 @@
     <p:sldMasterId id="2147483756" r:id="rId1"/>
   </p:sldMasterIdLst>
   <p:notesMasterIdLst>
-    <p:notesMasterId r:id="rId18"/>
+    <p:notesMasterId r:id="rId23"/>
   </p:notesMasterIdLst>
   <p:handoutMasterIdLst>
-    <p:handoutMasterId r:id="rId19"/>
+    <p:handoutMasterId r:id="rId24"/>
   </p:handoutMasterIdLst>
   <p:sldIdLst>
     <p:sldId id="256" r:id="rId2"/>
@@ -18,15 +18,20 @@
     <p:sldId id="260" r:id="rId6"/>
     <p:sldId id="261" r:id="rId7"/>
     <p:sldId id="262" r:id="rId8"/>
-    <p:sldId id="264" r:id="rId9"/>
-    <p:sldId id="265" r:id="rId10"/>
-    <p:sldId id="266" r:id="rId11"/>
-    <p:sldId id="267" r:id="rId12"/>
-    <p:sldId id="268" r:id="rId13"/>
-    <p:sldId id="269" r:id="rId14"/>
-    <p:sldId id="270" r:id="rId15"/>
-    <p:sldId id="271" r:id="rId16"/>
-    <p:sldId id="272" r:id="rId17"/>
+    <p:sldId id="271" r:id="rId9"/>
+    <p:sldId id="272" r:id="rId10"/>
+    <p:sldId id="264" r:id="rId11"/>
+    <p:sldId id="265" r:id="rId12"/>
+    <p:sldId id="266" r:id="rId13"/>
+    <p:sldId id="267" r:id="rId14"/>
+    <p:sldId id="268" r:id="rId15"/>
+    <p:sldId id="270" r:id="rId16"/>
+    <p:sldId id="269" r:id="rId17"/>
+    <p:sldId id="273" r:id="rId18"/>
+    <p:sldId id="274" r:id="rId19"/>
+    <p:sldId id="275" r:id="rId20"/>
+    <p:sldId id="276" r:id="rId21"/>
+    <p:sldId id="277" r:id="rId22"/>
   </p:sldIdLst>
   <p:sldSz cx="9144000" cy="6858000" type="screen4x3"/>
   <p:notesSz cx="6858000" cy="9144000"/>
@@ -226,7 +231,7 @@
           <a:p>
             <a:fld id="{6ECF00A8-A07A-4467-ACDB-1C845DED5994}" type="datetimeFigureOut">
               <a:rPr lang="vi-VN" smtClean="0"/>
-              <a:t>15/08/2016</a:t>
+              <a:t>16/08/2016</a:t>
             </a:fld>
             <a:endParaRPr lang="vi-VN"/>
           </a:p>
@@ -392,7 +397,7 @@
           <a:p>
             <a:fld id="{B160A22E-3772-4116-B7EB-7BF67761DCFA}" type="datetimeFigureOut">
               <a:rPr lang="vi-VN" smtClean="0"/>
-              <a:t>15/08/2016</a:t>
+              <a:t>16/08/2016</a:t>
             </a:fld>
             <a:endParaRPr lang="vi-VN"/>
           </a:p>
@@ -1054,7 +1059,7 @@
           <a:p>
             <a:fld id="{39F0CC17-7EC9-4E15-B37B-5710B13990F9}" type="datetime1">
               <a:rPr lang="vi-VN" smtClean="0"/>
-              <a:t>15/08/2016</a:t>
+              <a:t>16/08/2016</a:t>
             </a:fld>
             <a:endParaRPr lang="vi-VN"/>
           </a:p>
@@ -1223,7 +1228,7 @@
           <a:p>
             <a:fld id="{E43A4059-8142-4DA2-B066-5F4DD2FB5E06}" type="datetime1">
               <a:rPr lang="vi-VN" smtClean="0"/>
-              <a:t>15/08/2016</a:t>
+              <a:t>16/08/2016</a:t>
             </a:fld>
             <a:endParaRPr lang="vi-VN"/>
           </a:p>
@@ -1402,7 +1407,7 @@
           <a:p>
             <a:fld id="{9CF7AD8C-4EBA-416A-9A7D-E6EFC629A62F}" type="datetime1">
               <a:rPr lang="vi-VN" smtClean="0"/>
-              <a:t>15/08/2016</a:t>
+              <a:t>16/08/2016</a:t>
             </a:fld>
             <a:endParaRPr lang="vi-VN"/>
           </a:p>
@@ -1571,7 +1576,7 @@
           <a:p>
             <a:fld id="{A9DDAA69-63DC-4CE5-A419-81E8E516ED3D}" type="datetime1">
               <a:rPr lang="vi-VN" smtClean="0"/>
-              <a:t>15/08/2016</a:t>
+              <a:t>16/08/2016</a:t>
             </a:fld>
             <a:endParaRPr lang="vi-VN"/>
           </a:p>
@@ -1814,7 +1819,7 @@
           <a:p>
             <a:fld id="{77E4906C-BB1F-4E2F-8BD5-6613453C0F63}" type="datetime1">
               <a:rPr lang="vi-VN" smtClean="0"/>
-              <a:t>15/08/2016</a:t>
+              <a:t>16/08/2016</a:t>
             </a:fld>
             <a:endParaRPr lang="vi-VN"/>
           </a:p>
@@ -1908,7 +1913,7 @@
           <a:p>
             <a:fld id="{AB88C2D3-0FE3-4334-85DB-9E7E44AF30A2}" type="datetime1">
               <a:rPr lang="vi-VN" smtClean="0"/>
-              <a:t>15/08/2016</a:t>
+              <a:t>16/08/2016</a:t>
             </a:fld>
             <a:endParaRPr lang="vi-VN"/>
           </a:p>
@@ -2286,7 +2291,7 @@
           <a:p>
             <a:fld id="{B825EED1-8B1A-4B38-9953-5A0E685F7BDB}" type="datetime1">
               <a:rPr lang="vi-VN" smtClean="0"/>
-              <a:t>15/08/2016</a:t>
+              <a:t>16/08/2016</a:t>
             </a:fld>
             <a:endParaRPr lang="vi-VN"/>
           </a:p>
@@ -2545,7 +2550,7 @@
           <a:p>
             <a:fld id="{84FA7773-8D05-45AA-8C19-CD1706285D25}" type="datetime1">
               <a:rPr lang="vi-VN" smtClean="0"/>
-              <a:t>15/08/2016</a:t>
+              <a:t>16/08/2016</a:t>
             </a:fld>
             <a:endParaRPr lang="vi-VN"/>
           </a:p>
@@ -2639,7 +2644,7 @@
           <a:p>
             <a:fld id="{D3ACCC54-891E-4F44-BA5A-8FAA00C4274E}" type="datetime1">
               <a:rPr lang="vi-VN" smtClean="0"/>
-              <a:t>15/08/2016</a:t>
+              <a:t>16/08/2016</a:t>
             </a:fld>
             <a:endParaRPr lang="vi-VN"/>
           </a:p>
@@ -2917,7 +2922,7 @@
           <a:p>
             <a:fld id="{79D84A11-1AF9-4225-9A2C-B7CA58F66B2E}" type="datetime1">
               <a:rPr lang="vi-VN" smtClean="0"/>
-              <a:t>15/08/2016</a:t>
+              <a:t>16/08/2016</a:t>
             </a:fld>
             <a:endParaRPr lang="vi-VN"/>
           </a:p>
@@ -3193,7 +3198,7 @@
           <a:p>
             <a:fld id="{6FD46428-1F3F-4CF9-8B9A-BDAA70020735}" type="datetime1">
               <a:rPr lang="vi-VN" smtClean="0"/>
-              <a:t>15/08/2016</a:t>
+              <a:t>16/08/2016</a:t>
             </a:fld>
             <a:endParaRPr lang="vi-VN"/>
           </a:p>
@@ -3497,7 +3502,7 @@
           <a:p>
             <a:fld id="{671F9AFF-5F6E-47AD-B670-1896AED35974}" type="datetime1">
               <a:rPr lang="vi-VN" smtClean="0"/>
-              <a:t>15/08/2016</a:t>
+              <a:t>16/08/2016</a:t>
             </a:fld>
             <a:endParaRPr lang="vi-VN"/>
           </a:p>
@@ -4109,48 +4114,335 @@
         </p:nvSpPr>
         <p:spPr/>
         <p:txBody>
-          <a:bodyPr/>
-          <a:lstStyle/>
-          <a:p>
-            <a:r>
-              <a:rPr lang="en-US" dirty="0" err="1" smtClean="0"/>
+          <a:bodyPr>
+            <a:normAutofit/>
+          </a:bodyPr>
+          <a:lstStyle/>
+          <a:p>
+            <a:r>
+              <a:rPr lang="en-US" dirty="0" smtClean="0"/>
+              <a:t>2.2  </a:t>
+            </a:r>
+            <a:r>
+              <a:rPr lang="en-US" dirty="0" err="1" smtClean="0"/>
+              <a:t>Chức</a:t>
+            </a:r>
+            <a:r>
+              <a:rPr lang="en-US" dirty="0" smtClean="0"/>
+              <a:t> </a:t>
+            </a:r>
+            <a:r>
+              <a:rPr lang="en-US" dirty="0" err="1" smtClean="0"/>
+              <a:t>năng</a:t>
+            </a:r>
+            <a:endParaRPr lang="vi-VN" dirty="0"/>
+          </a:p>
+        </p:txBody>
+      </p:sp>
+      <p:sp>
+        <p:nvSpPr>
+          <p:cNvPr id="3" name="Content Placeholder 2"/>
+          <p:cNvSpPr>
+            <a:spLocks noGrp="1"/>
+          </p:cNvSpPr>
+          <p:nvPr>
+            <p:ph idx="1"/>
+          </p:nvPr>
+        </p:nvSpPr>
+        <p:spPr/>
+        <p:txBody>
+          <a:bodyPr/>
+          <a:lstStyle/>
+          <a:p>
+            <a:r>
+              <a:rPr lang="en-US" dirty="0" err="1" smtClean="0"/>
+              <a:t>Chương</a:t>
+            </a:r>
+            <a:r>
+              <a:rPr lang="en-US" dirty="0" smtClean="0"/>
+              <a:t> </a:t>
+            </a:r>
+            <a:r>
+              <a:rPr lang="en-US" dirty="0" err="1" smtClean="0"/>
+              <a:t>trình</a:t>
+            </a:r>
+            <a:r>
+              <a:rPr lang="en-US" dirty="0" smtClean="0"/>
+              <a:t> </a:t>
+            </a:r>
+            <a:r>
+              <a:rPr lang="en-US" dirty="0" err="1" smtClean="0"/>
+              <a:t>có</a:t>
+            </a:r>
+            <a:r>
+              <a:rPr lang="en-US" dirty="0" smtClean="0"/>
+              <a:t> </a:t>
+            </a:r>
+            <a:r>
+              <a:rPr lang="en-US" dirty="0" err="1" smtClean="0"/>
+              <a:t>các</a:t>
+            </a:r>
+            <a:r>
+              <a:rPr lang="en-US" dirty="0" smtClean="0"/>
+              <a:t> </a:t>
+            </a:r>
+            <a:r>
+              <a:rPr lang="en-US" dirty="0" err="1" smtClean="0"/>
+              <a:t>chức</a:t>
+            </a:r>
+            <a:r>
+              <a:rPr lang="en-US" dirty="0" smtClean="0"/>
+              <a:t> </a:t>
+            </a:r>
+            <a:r>
+              <a:rPr lang="en-US" dirty="0" err="1" smtClean="0"/>
+              <a:t>năng</a:t>
+            </a:r>
+            <a:r>
+              <a:rPr lang="en-US" dirty="0" smtClean="0"/>
+              <a:t> </a:t>
+            </a:r>
+            <a:r>
+              <a:rPr lang="en-US" dirty="0" err="1" smtClean="0"/>
+              <a:t>cơ</a:t>
+            </a:r>
+            <a:r>
+              <a:rPr lang="en-US" dirty="0" smtClean="0"/>
+              <a:t> </a:t>
+            </a:r>
+            <a:r>
+              <a:rPr lang="en-US" dirty="0" err="1" smtClean="0"/>
+              <a:t>bản</a:t>
+            </a:r>
+            <a:r>
+              <a:rPr lang="en-US" dirty="0"/>
+              <a:t> </a:t>
+            </a:r>
+            <a:r>
+              <a:rPr lang="en-US" dirty="0" err="1" smtClean="0"/>
+              <a:t>của</a:t>
+            </a:r>
+            <a:r>
+              <a:rPr lang="en-US" dirty="0" smtClean="0"/>
+              <a:t> </a:t>
+            </a:r>
+            <a:r>
+              <a:rPr lang="en-US" dirty="0" err="1" smtClean="0"/>
+              <a:t>một</a:t>
+            </a:r>
+            <a:r>
+              <a:rPr lang="en-US" dirty="0" smtClean="0"/>
+              <a:t> </a:t>
+            </a:r>
+            <a:r>
+              <a:rPr lang="en-US" dirty="0" err="1" smtClean="0"/>
+              <a:t>cửa</a:t>
+            </a:r>
+            <a:r>
+              <a:rPr lang="en-US" dirty="0" smtClean="0"/>
+              <a:t> </a:t>
+            </a:r>
+            <a:r>
+              <a:rPr lang="en-US" dirty="0" err="1" smtClean="0"/>
+              <a:t>hàng</a:t>
+            </a:r>
+            <a:r>
+              <a:rPr lang="en-US" dirty="0" smtClean="0"/>
+              <a:t>/</a:t>
+            </a:r>
+            <a:r>
+              <a:rPr lang="en-US" dirty="0" err="1" smtClean="0"/>
+              <a:t>quán</a:t>
+            </a:r>
+            <a:r>
+              <a:rPr lang="en-US" dirty="0" smtClean="0"/>
+              <a:t> </a:t>
+            </a:r>
+            <a:r>
+              <a:rPr lang="en-US" dirty="0" err="1" smtClean="0"/>
+              <a:t>ăn</a:t>
+            </a:r>
+            <a:r>
+              <a:rPr lang="en-US" dirty="0" smtClean="0"/>
+              <a:t> </a:t>
+            </a:r>
+            <a:r>
+              <a:rPr lang="en-US" dirty="0" err="1" smtClean="0"/>
+              <a:t>bất</a:t>
+            </a:r>
+            <a:r>
+              <a:rPr lang="en-US" dirty="0" smtClean="0"/>
+              <a:t> </a:t>
+            </a:r>
+            <a:r>
+              <a:rPr lang="en-US" dirty="0" err="1" smtClean="0"/>
+              <a:t>kì</a:t>
+            </a:r>
+            <a:r>
+              <a:rPr lang="en-US" dirty="0" smtClean="0"/>
+              <a:t> </a:t>
+            </a:r>
+            <a:r>
+              <a:rPr lang="en-US" dirty="0" err="1" smtClean="0"/>
+              <a:t>nào</a:t>
+            </a:r>
+            <a:r>
+              <a:rPr lang="en-US" dirty="0"/>
+              <a:t>.</a:t>
+            </a:r>
+            <a:endParaRPr lang="en-US" dirty="0" smtClean="0"/>
+          </a:p>
+          <a:p>
+            <a:pPr lvl="1">
+              <a:buFont typeface="Arial" pitchFamily="34" charset="0"/>
+              <a:buChar char="•"/>
+            </a:pPr>
+            <a:r>
+              <a:rPr lang="en-US" dirty="0" err="1"/>
+              <a:t>Thêm</a:t>
+            </a:r>
+            <a:r>
+              <a:rPr lang="en-US" dirty="0"/>
+              <a:t> </a:t>
+            </a:r>
+            <a:r>
+              <a:rPr lang="en-US" dirty="0" err="1"/>
+              <a:t>mặt</a:t>
+            </a:r>
+            <a:r>
+              <a:rPr lang="en-US" dirty="0"/>
+              <a:t> </a:t>
+            </a:r>
+            <a:r>
+              <a:rPr lang="en-US" dirty="0" err="1"/>
+              <a:t>hàng</a:t>
+            </a:r>
+            <a:endParaRPr lang="en-US" dirty="0"/>
+          </a:p>
+          <a:p>
+            <a:pPr lvl="1">
+              <a:buFont typeface="Arial" pitchFamily="34" charset="0"/>
+              <a:buChar char="•"/>
+            </a:pPr>
+            <a:r>
+              <a:rPr lang="en-US" dirty="0" err="1"/>
               <a:t>Xóa</a:t>
             </a:r>
             <a:r>
-              <a:rPr lang="en-US" dirty="0" smtClean="0"/>
-              <a:t> </a:t>
-            </a:r>
-            <a:r>
-              <a:rPr lang="en-US" dirty="0" err="1" smtClean="0"/>
+              <a:rPr lang="en-US" dirty="0"/>
+              <a:t> </a:t>
+            </a:r>
+            <a:r>
+              <a:rPr lang="en-US" dirty="0" err="1"/>
               <a:t>mặt</a:t>
             </a:r>
             <a:r>
-              <a:rPr lang="en-US" dirty="0" smtClean="0"/>
-              <a:t> </a:t>
-            </a:r>
-            <a:r>
-              <a:rPr lang="en-US" dirty="0" err="1" smtClean="0"/>
+              <a:rPr lang="en-US" dirty="0"/>
+              <a:t> </a:t>
+            </a:r>
+            <a:r>
+              <a:rPr lang="en-US" dirty="0" err="1"/>
               <a:t>hàng</a:t>
             </a:r>
-            <a:endParaRPr lang="vi-VN" dirty="0"/>
-          </a:p>
-        </p:txBody>
-      </p:sp>
-      <p:sp>
-        <p:nvSpPr>
-          <p:cNvPr id="3" name="Content Placeholder 2"/>
-          <p:cNvSpPr>
-            <a:spLocks noGrp="1"/>
-          </p:cNvSpPr>
-          <p:nvPr>
-            <p:ph idx="1"/>
-          </p:nvPr>
-        </p:nvSpPr>
-        <p:spPr/>
-        <p:txBody>
-          <a:bodyPr/>
-          <a:lstStyle/>
-          <a:p>
+            <a:endParaRPr lang="en-US" dirty="0"/>
+          </a:p>
+          <a:p>
+            <a:pPr lvl="1">
+              <a:buFont typeface="Arial" pitchFamily="34" charset="0"/>
+              <a:buChar char="•"/>
+            </a:pPr>
+            <a:r>
+              <a:rPr lang="en-US" dirty="0" err="1"/>
+              <a:t>Nhập</a:t>
+            </a:r>
+            <a:r>
+              <a:rPr lang="en-US" dirty="0"/>
+              <a:t> </a:t>
+            </a:r>
+            <a:r>
+              <a:rPr lang="en-US" dirty="0" err="1"/>
+              <a:t>kho</a:t>
+            </a:r>
+            <a:endParaRPr lang="en-US" dirty="0"/>
+          </a:p>
+          <a:p>
+            <a:pPr lvl="1">
+              <a:buFont typeface="Arial" pitchFamily="34" charset="0"/>
+              <a:buChar char="•"/>
+            </a:pPr>
+            <a:r>
+              <a:rPr lang="en-US" dirty="0" err="1"/>
+              <a:t>Xuất</a:t>
+            </a:r>
+            <a:r>
+              <a:rPr lang="en-US" dirty="0"/>
+              <a:t> </a:t>
+            </a:r>
+            <a:r>
+              <a:rPr lang="en-US" dirty="0" err="1"/>
+              <a:t>kho</a:t>
+            </a:r>
+            <a:endParaRPr lang="en-US" dirty="0"/>
+          </a:p>
+          <a:p>
+            <a:pPr lvl="1">
+              <a:buFont typeface="Arial" pitchFamily="34" charset="0"/>
+              <a:buChar char="•"/>
+            </a:pPr>
+            <a:r>
+              <a:rPr lang="en-US" dirty="0" err="1"/>
+              <a:t>Thanh</a:t>
+            </a:r>
+            <a:r>
+              <a:rPr lang="en-US" dirty="0"/>
+              <a:t> </a:t>
+            </a:r>
+            <a:r>
+              <a:rPr lang="en-US" dirty="0" err="1"/>
+              <a:t>toán</a:t>
+            </a:r>
+            <a:endParaRPr lang="en-US" dirty="0"/>
+          </a:p>
+          <a:p>
+            <a:pPr lvl="1">
+              <a:buFont typeface="Arial" pitchFamily="34" charset="0"/>
+              <a:buChar char="•"/>
+            </a:pPr>
+            <a:r>
+              <a:rPr lang="en-US" dirty="0" err="1"/>
+              <a:t>Thống</a:t>
+            </a:r>
+            <a:r>
+              <a:rPr lang="en-US" dirty="0"/>
+              <a:t> </a:t>
+            </a:r>
+            <a:r>
+              <a:rPr lang="en-US" dirty="0" err="1"/>
+              <a:t>kê</a:t>
+            </a:r>
+            <a:r>
+              <a:rPr lang="en-US" dirty="0"/>
+              <a:t> </a:t>
+            </a:r>
+            <a:r>
+              <a:rPr lang="en-US" dirty="0" err="1"/>
+              <a:t>doanh</a:t>
+            </a:r>
+            <a:r>
+              <a:rPr lang="en-US" dirty="0"/>
+              <a:t> </a:t>
+            </a:r>
+            <a:r>
+              <a:rPr lang="en-US" dirty="0" err="1"/>
+              <a:t>thu</a:t>
+            </a:r>
+            <a:endParaRPr lang="en-US" dirty="0"/>
+          </a:p>
+          <a:p>
+            <a:pPr lvl="1">
+              <a:buFont typeface="Arial" pitchFamily="34" charset="0"/>
+              <a:buChar char="•"/>
+            </a:pPr>
             <a:r>
               <a:rPr lang="en-US" dirty="0" err="1" smtClean="0"/>
               <a:t>Thay</a:t>
@@ -4161,265 +4453,27 @@
             </a:r>
             <a:r>
               <a:rPr lang="en-US" dirty="0" err="1" smtClean="0"/>
-              <a:t>vì</a:t>
-            </a:r>
-            <a:r>
-              <a:rPr lang="en-US" dirty="0" smtClean="0"/>
-              <a:t> </a:t>
-            </a:r>
-            <a:r>
-              <a:rPr lang="en-US" dirty="0" err="1" smtClean="0"/>
-              <a:t>xóa</a:t>
-            </a:r>
-            <a:r>
-              <a:rPr lang="en-US" dirty="0" smtClean="0"/>
-              <a:t> </a:t>
-            </a:r>
-            <a:r>
-              <a:rPr lang="en-US" dirty="0" err="1" smtClean="0"/>
-              <a:t>mặt</a:t>
-            </a:r>
-            <a:r>
-              <a:rPr lang="en-US" dirty="0" smtClean="0"/>
-              <a:t> </a:t>
+              <a:t>đổi</a:t>
+            </a:r>
+            <a:r>
+              <a:rPr lang="en-US" dirty="0" smtClean="0"/>
+              <a:t> </a:t>
+            </a:r>
+            <a:r>
+              <a:rPr lang="en-US" dirty="0" err="1" smtClean="0"/>
+              <a:t>thông</a:t>
+            </a:r>
+            <a:r>
+              <a:rPr lang="en-US" dirty="0" smtClean="0"/>
+              <a:t> tin </a:t>
             </a:r>
             <a:r>
               <a:rPr lang="en-US" dirty="0" err="1" smtClean="0"/>
               <a:t>hàng</a:t>
             </a:r>
-            <a:r>
-              <a:rPr lang="en-US" dirty="0" smtClean="0"/>
-              <a:t>, </a:t>
-            </a:r>
-            <a:r>
-              <a:rPr lang="en-US" dirty="0" err="1" smtClean="0"/>
-              <a:t>điều</a:t>
-            </a:r>
-            <a:r>
-              <a:rPr lang="en-US" dirty="0" smtClean="0"/>
-              <a:t> </a:t>
-            </a:r>
-            <a:r>
-              <a:rPr lang="en-US" dirty="0" err="1" smtClean="0"/>
-              <a:t>chỉnh</a:t>
-            </a:r>
-            <a:r>
-              <a:rPr lang="en-US" dirty="0" smtClean="0"/>
-              <a:t> </a:t>
-            </a:r>
-            <a:r>
-              <a:rPr lang="en-US" dirty="0" err="1" smtClean="0"/>
-              <a:t>số</a:t>
-            </a:r>
-            <a:r>
-              <a:rPr lang="en-US" dirty="0" smtClean="0"/>
-              <a:t> </a:t>
-            </a:r>
-            <a:r>
-              <a:rPr lang="en-US" dirty="0" err="1" smtClean="0"/>
-              <a:t>lượng</a:t>
-            </a:r>
-            <a:r>
-              <a:rPr lang="en-US" dirty="0" smtClean="0"/>
-              <a:t> </a:t>
-            </a:r>
-            <a:r>
-              <a:rPr lang="en-US" dirty="0" err="1" smtClean="0"/>
-              <a:t>mặt</a:t>
-            </a:r>
-            <a:r>
-              <a:rPr lang="en-US" dirty="0" smtClean="0"/>
-              <a:t> </a:t>
-            </a:r>
-            <a:r>
-              <a:rPr lang="en-US" dirty="0" err="1" smtClean="0"/>
-              <a:t>hàng</a:t>
-            </a:r>
-            <a:r>
-              <a:rPr lang="en-US" dirty="0" smtClean="0"/>
-              <a:t> </a:t>
-            </a:r>
-            <a:r>
-              <a:rPr lang="en-US" dirty="0" err="1" smtClean="0"/>
-              <a:t>về</a:t>
-            </a:r>
-            <a:r>
-              <a:rPr lang="en-US" dirty="0" smtClean="0"/>
-              <a:t> 0</a:t>
-            </a:r>
-          </a:p>
-          <a:p>
-            <a:r>
-              <a:rPr lang="en-US" dirty="0" err="1" smtClean="0"/>
-              <a:t>Mặt</a:t>
-            </a:r>
-            <a:r>
-              <a:rPr lang="en-US" dirty="0" smtClean="0"/>
-              <a:t> </a:t>
-            </a:r>
-            <a:r>
-              <a:rPr lang="en-US" dirty="0" err="1" smtClean="0"/>
-              <a:t>hàng</a:t>
-            </a:r>
-            <a:r>
-              <a:rPr lang="en-US" dirty="0" smtClean="0"/>
-              <a:t> </a:t>
-            </a:r>
-            <a:r>
-              <a:rPr lang="en-US" dirty="0" err="1" smtClean="0"/>
-              <a:t>đã</a:t>
-            </a:r>
-            <a:r>
-              <a:rPr lang="en-US" dirty="0" smtClean="0"/>
-              <a:t> </a:t>
-            </a:r>
-            <a:r>
-              <a:rPr lang="en-US" dirty="0" err="1" smtClean="0"/>
-              <a:t>xóa</a:t>
-            </a:r>
-            <a:r>
-              <a:rPr lang="en-US" dirty="0" smtClean="0"/>
-              <a:t> </a:t>
-            </a:r>
-            <a:r>
-              <a:rPr lang="en-US" dirty="0" err="1" smtClean="0"/>
-              <a:t>sẽ</a:t>
-            </a:r>
-            <a:r>
-              <a:rPr lang="en-US" dirty="0" smtClean="0"/>
-              <a:t> </a:t>
-            </a:r>
-            <a:r>
-              <a:rPr lang="en-US" dirty="0" err="1" smtClean="0"/>
-              <a:t>không</a:t>
-            </a:r>
-            <a:r>
-              <a:rPr lang="en-US" dirty="0" smtClean="0"/>
-              <a:t> </a:t>
-            </a:r>
-            <a:r>
-              <a:rPr lang="en-US" dirty="0" err="1" smtClean="0"/>
-              <a:t>xuất</a:t>
-            </a:r>
-            <a:r>
-              <a:rPr lang="en-US" dirty="0" smtClean="0"/>
-              <a:t> </a:t>
-            </a:r>
-            <a:r>
-              <a:rPr lang="en-US" dirty="0" err="1" smtClean="0"/>
-              <a:t>hiện</a:t>
-            </a:r>
-            <a:r>
-              <a:rPr lang="en-US" dirty="0" smtClean="0"/>
-              <a:t> </a:t>
-            </a:r>
-            <a:r>
-              <a:rPr lang="en-US" dirty="0" err="1" smtClean="0"/>
-              <a:t>trong</a:t>
-            </a:r>
-            <a:r>
-              <a:rPr lang="en-US" dirty="0" smtClean="0"/>
-              <a:t> </a:t>
-            </a:r>
-            <a:r>
-              <a:rPr lang="en-US" dirty="0" err="1" smtClean="0"/>
-              <a:t>danh</a:t>
-            </a:r>
-            <a:r>
-              <a:rPr lang="en-US" dirty="0" smtClean="0"/>
-              <a:t> </a:t>
-            </a:r>
-            <a:r>
-              <a:rPr lang="en-US" dirty="0" err="1" smtClean="0"/>
-              <a:t>sách</a:t>
-            </a:r>
-            <a:r>
-              <a:rPr lang="en-US" dirty="0" smtClean="0"/>
-              <a:t> </a:t>
-            </a:r>
-            <a:r>
-              <a:rPr lang="en-US" dirty="0" err="1" smtClean="0"/>
-              <a:t>hàng</a:t>
-            </a:r>
             <a:endParaRPr lang="en-US" dirty="0" smtClean="0"/>
           </a:p>
           <a:p>
-            <a:r>
-              <a:rPr lang="en-US" dirty="0" err="1" smtClean="0"/>
-              <a:t>Người</a:t>
-            </a:r>
-            <a:r>
-              <a:rPr lang="en-US" dirty="0" smtClean="0"/>
-              <a:t> </a:t>
-            </a:r>
-            <a:r>
-              <a:rPr lang="en-US" dirty="0" err="1" smtClean="0"/>
-              <a:t>dùng</a:t>
-            </a:r>
-            <a:r>
-              <a:rPr lang="en-US" dirty="0" smtClean="0"/>
-              <a:t> </a:t>
-            </a:r>
-            <a:r>
-              <a:rPr lang="en-US" dirty="0" err="1" smtClean="0"/>
-              <a:t>có</a:t>
-            </a:r>
-            <a:r>
-              <a:rPr lang="en-US" dirty="0" smtClean="0"/>
-              <a:t> </a:t>
-            </a:r>
-            <a:r>
-              <a:rPr lang="en-US" dirty="0" err="1" smtClean="0"/>
-              <a:t>thể</a:t>
-            </a:r>
-            <a:r>
-              <a:rPr lang="en-US" dirty="0" smtClean="0"/>
-              <a:t> </a:t>
-            </a:r>
-            <a:r>
-              <a:rPr lang="en-US" dirty="0" err="1" smtClean="0"/>
-              <a:t>khôi</a:t>
-            </a:r>
-            <a:r>
-              <a:rPr lang="en-US" dirty="0" smtClean="0"/>
-              <a:t> </a:t>
-            </a:r>
-            <a:r>
-              <a:rPr lang="en-US" dirty="0" err="1" smtClean="0"/>
-              <a:t>phục</a:t>
-            </a:r>
-            <a:r>
-              <a:rPr lang="en-US" dirty="0" smtClean="0"/>
-              <a:t> </a:t>
-            </a:r>
-            <a:r>
-              <a:rPr lang="en-US" dirty="0" err="1" smtClean="0"/>
-              <a:t>mặt</a:t>
-            </a:r>
-            <a:r>
-              <a:rPr lang="en-US" dirty="0" smtClean="0"/>
-              <a:t> </a:t>
-            </a:r>
-            <a:r>
-              <a:rPr lang="en-US" dirty="0" err="1" smtClean="0"/>
-              <a:t>hàng</a:t>
-            </a:r>
-            <a:r>
-              <a:rPr lang="en-US" dirty="0" smtClean="0"/>
-              <a:t> </a:t>
-            </a:r>
-            <a:r>
-              <a:rPr lang="en-US" dirty="0" err="1" smtClean="0"/>
-              <a:t>đã</a:t>
-            </a:r>
-            <a:r>
-              <a:rPr lang="en-US" dirty="0" smtClean="0"/>
-              <a:t> </a:t>
-            </a:r>
-            <a:r>
-              <a:rPr lang="en-US" dirty="0" err="1" smtClean="0"/>
-              <a:t>xóa</a:t>
-            </a:r>
             <a:endParaRPr lang="vi-VN" dirty="0"/>
           </a:p>
         </p:txBody>
@@ -4450,7 +4504,7 @@
     </p:spTree>
     <p:extLst>
       <p:ext uri="{BB962C8B-B14F-4D97-AF65-F5344CB8AC3E}">
-        <p14:creationId xmlns:p14="http://schemas.microsoft.com/office/powerpoint/2010/main" val="1472940003"/>
+        <p14:creationId xmlns:p14="http://schemas.microsoft.com/office/powerpoint/2010/main" val="17090828"/>
       </p:ext>
     </p:extLst>
   </p:cSld>
@@ -4494,6 +4548,743 @@
           <a:p>
             <a:r>
               <a:rPr lang="en-US" dirty="0" err="1" smtClean="0"/>
+              <a:t>Thêm</a:t>
+            </a:r>
+            <a:r>
+              <a:rPr lang="en-US" dirty="0" smtClean="0"/>
+              <a:t> </a:t>
+            </a:r>
+            <a:r>
+              <a:rPr lang="en-US" dirty="0" err="1" smtClean="0"/>
+              <a:t>mặt</a:t>
+            </a:r>
+            <a:r>
+              <a:rPr lang="en-US" dirty="0" smtClean="0"/>
+              <a:t> </a:t>
+            </a:r>
+            <a:r>
+              <a:rPr lang="en-US" dirty="0" err="1" smtClean="0"/>
+              <a:t>hàng</a:t>
+            </a:r>
+            <a:endParaRPr lang="vi-VN" dirty="0"/>
+          </a:p>
+        </p:txBody>
+      </p:sp>
+      <p:sp>
+        <p:nvSpPr>
+          <p:cNvPr id="3" name="Content Placeholder 2"/>
+          <p:cNvSpPr>
+            <a:spLocks noGrp="1"/>
+          </p:cNvSpPr>
+          <p:nvPr>
+            <p:ph idx="1"/>
+          </p:nvPr>
+        </p:nvSpPr>
+        <p:spPr/>
+        <p:txBody>
+          <a:bodyPr/>
+          <a:lstStyle/>
+          <a:p>
+            <a:r>
+              <a:rPr lang="en-US" dirty="0" smtClean="0"/>
+              <a:t>Cho </a:t>
+            </a:r>
+            <a:r>
+              <a:rPr lang="en-US" dirty="0" err="1" smtClean="0"/>
+              <a:t>phép</a:t>
+            </a:r>
+            <a:r>
+              <a:rPr lang="en-US" dirty="0" smtClean="0"/>
+              <a:t> </a:t>
+            </a:r>
+            <a:r>
+              <a:rPr lang="en-US" dirty="0" err="1" smtClean="0"/>
+              <a:t>thêm</a:t>
+            </a:r>
+            <a:r>
+              <a:rPr lang="en-US" dirty="0" smtClean="0"/>
+              <a:t> 1 </a:t>
+            </a:r>
+            <a:r>
+              <a:rPr lang="en-US" dirty="0" err="1" smtClean="0"/>
+              <a:t>mặt</a:t>
+            </a:r>
+            <a:r>
+              <a:rPr lang="en-US" dirty="0" smtClean="0"/>
+              <a:t> </a:t>
+            </a:r>
+            <a:r>
+              <a:rPr lang="en-US" dirty="0" err="1" smtClean="0"/>
+              <a:t>hàng</a:t>
+            </a:r>
+            <a:r>
+              <a:rPr lang="en-US" dirty="0" smtClean="0"/>
+              <a:t> </a:t>
+            </a:r>
+            <a:r>
+              <a:rPr lang="en-US" dirty="0" err="1" smtClean="0"/>
+              <a:t>vào</a:t>
+            </a:r>
+            <a:r>
+              <a:rPr lang="en-US" dirty="0" smtClean="0"/>
+              <a:t> </a:t>
+            </a:r>
+            <a:r>
+              <a:rPr lang="en-US" dirty="0" err="1" smtClean="0"/>
+              <a:t>cơ</a:t>
+            </a:r>
+            <a:r>
+              <a:rPr lang="en-US" dirty="0" smtClean="0"/>
+              <a:t> </a:t>
+            </a:r>
+            <a:r>
+              <a:rPr lang="en-US" dirty="0" err="1" smtClean="0"/>
+              <a:t>sở</a:t>
+            </a:r>
+            <a:r>
+              <a:rPr lang="en-US" dirty="0" smtClean="0"/>
+              <a:t> </a:t>
+            </a:r>
+            <a:r>
+              <a:rPr lang="en-US" dirty="0" err="1" smtClean="0"/>
+              <a:t>dữ</a:t>
+            </a:r>
+            <a:r>
+              <a:rPr lang="en-US" dirty="0" smtClean="0"/>
+              <a:t> </a:t>
+            </a:r>
+            <a:r>
+              <a:rPr lang="en-US" dirty="0" err="1" smtClean="0"/>
+              <a:t>liệu</a:t>
+            </a:r>
+            <a:r>
+              <a:rPr lang="en-US" dirty="0" smtClean="0"/>
+              <a:t> </a:t>
+            </a:r>
+            <a:r>
+              <a:rPr lang="en-US" dirty="0" err="1" smtClean="0"/>
+              <a:t>với</a:t>
+            </a:r>
+            <a:r>
+              <a:rPr lang="en-US" dirty="0" smtClean="0"/>
+              <a:t> </a:t>
+            </a:r>
+            <a:r>
+              <a:rPr lang="en-US" dirty="0" err="1" smtClean="0"/>
+              <a:t>các</a:t>
+            </a:r>
+            <a:r>
+              <a:rPr lang="en-US" dirty="0" smtClean="0"/>
+              <a:t> </a:t>
+            </a:r>
+            <a:r>
+              <a:rPr lang="en-US" dirty="0" err="1" smtClean="0"/>
+              <a:t>thông</a:t>
+            </a:r>
+            <a:r>
+              <a:rPr lang="en-US" dirty="0" smtClean="0"/>
+              <a:t> tin:</a:t>
+            </a:r>
+          </a:p>
+          <a:p>
+            <a:pPr lvl="1"/>
+            <a:r>
+              <a:rPr lang="en-US" dirty="0" err="1" smtClean="0"/>
+              <a:t>Tên</a:t>
+            </a:r>
+            <a:r>
+              <a:rPr lang="en-US" dirty="0" smtClean="0"/>
+              <a:t> </a:t>
+            </a:r>
+            <a:r>
+              <a:rPr lang="en-US" dirty="0" err="1" smtClean="0"/>
+              <a:t>mặt</a:t>
+            </a:r>
+            <a:r>
+              <a:rPr lang="en-US" dirty="0" smtClean="0"/>
+              <a:t> </a:t>
+            </a:r>
+            <a:r>
+              <a:rPr lang="en-US" dirty="0" err="1" smtClean="0"/>
+              <a:t>hàng</a:t>
+            </a:r>
+            <a:endParaRPr lang="en-US" dirty="0" smtClean="0"/>
+          </a:p>
+          <a:p>
+            <a:pPr lvl="1"/>
+            <a:r>
+              <a:rPr lang="en-US" dirty="0" err="1" smtClean="0"/>
+              <a:t>Mã</a:t>
+            </a:r>
+            <a:r>
+              <a:rPr lang="en-US" dirty="0" smtClean="0"/>
+              <a:t> </a:t>
+            </a:r>
+            <a:r>
+              <a:rPr lang="en-US" dirty="0" err="1" smtClean="0"/>
+              <a:t>mặt</a:t>
+            </a:r>
+            <a:r>
+              <a:rPr lang="en-US" dirty="0" smtClean="0"/>
+              <a:t> </a:t>
+            </a:r>
+            <a:r>
+              <a:rPr lang="en-US" dirty="0" err="1" smtClean="0"/>
+              <a:t>hàng</a:t>
+            </a:r>
+            <a:endParaRPr lang="en-US" dirty="0" smtClean="0"/>
+          </a:p>
+          <a:p>
+            <a:pPr lvl="1"/>
+            <a:r>
+              <a:rPr lang="en-US" dirty="0" err="1" smtClean="0"/>
+              <a:t>Giá</a:t>
+            </a:r>
+            <a:r>
+              <a:rPr lang="en-US" dirty="0" smtClean="0"/>
+              <a:t> </a:t>
+            </a:r>
+            <a:r>
+              <a:rPr lang="en-US" dirty="0" err="1" smtClean="0"/>
+              <a:t>nhập</a:t>
+            </a:r>
+            <a:endParaRPr lang="en-US" dirty="0" smtClean="0"/>
+          </a:p>
+          <a:p>
+            <a:pPr lvl="1"/>
+            <a:r>
+              <a:rPr lang="en-US" dirty="0" err="1" smtClean="0"/>
+              <a:t>Giá</a:t>
+            </a:r>
+            <a:r>
+              <a:rPr lang="en-US" dirty="0" smtClean="0"/>
+              <a:t> </a:t>
+            </a:r>
+            <a:r>
+              <a:rPr lang="en-US" dirty="0" err="1" smtClean="0"/>
+              <a:t>bán</a:t>
+            </a:r>
+            <a:endParaRPr lang="en-US" dirty="0" smtClean="0"/>
+          </a:p>
+          <a:p>
+            <a:pPr lvl="1"/>
+            <a:r>
+              <a:rPr lang="en-US" dirty="0" err="1" smtClean="0"/>
+              <a:t>Số</a:t>
+            </a:r>
+            <a:r>
+              <a:rPr lang="en-US" dirty="0" smtClean="0"/>
+              <a:t> </a:t>
+            </a:r>
+            <a:r>
+              <a:rPr lang="en-US" dirty="0" err="1" smtClean="0"/>
+              <a:t>lượng</a:t>
+            </a:r>
+            <a:r>
+              <a:rPr lang="en-US" dirty="0" smtClean="0"/>
+              <a:t> (</a:t>
+            </a:r>
+            <a:r>
+              <a:rPr lang="en-US" dirty="0" err="1" smtClean="0"/>
+              <a:t>có</a:t>
+            </a:r>
+            <a:r>
+              <a:rPr lang="en-US" dirty="0" smtClean="0"/>
+              <a:t> </a:t>
+            </a:r>
+            <a:r>
+              <a:rPr lang="en-US" dirty="0" err="1" smtClean="0"/>
+              <a:t>thể</a:t>
+            </a:r>
+            <a:r>
+              <a:rPr lang="en-US" dirty="0" smtClean="0"/>
+              <a:t> </a:t>
+            </a:r>
+            <a:r>
+              <a:rPr lang="en-US" dirty="0" err="1" smtClean="0"/>
+              <a:t>là</a:t>
+            </a:r>
+            <a:r>
+              <a:rPr lang="en-US" dirty="0" smtClean="0"/>
+              <a:t> 0)</a:t>
+            </a:r>
+          </a:p>
+          <a:p>
+            <a:pPr lvl="1"/>
+            <a:r>
+              <a:rPr lang="en-US" dirty="0" err="1" smtClean="0"/>
+              <a:t>Nhà</a:t>
+            </a:r>
+            <a:r>
+              <a:rPr lang="en-US" dirty="0" smtClean="0"/>
+              <a:t> </a:t>
+            </a:r>
+            <a:r>
+              <a:rPr lang="en-US" dirty="0" err="1" smtClean="0"/>
+              <a:t>sản</a:t>
+            </a:r>
+            <a:r>
+              <a:rPr lang="en-US" dirty="0" smtClean="0"/>
+              <a:t> </a:t>
+            </a:r>
+            <a:r>
+              <a:rPr lang="en-US" dirty="0" err="1" smtClean="0"/>
+              <a:t>xuất</a:t>
+            </a:r>
+            <a:endParaRPr lang="vi-VN" dirty="0"/>
+          </a:p>
+        </p:txBody>
+      </p:sp>
+      <p:sp>
+        <p:nvSpPr>
+          <p:cNvPr id="4" name="Slide Number Placeholder 3"/>
+          <p:cNvSpPr>
+            <a:spLocks noGrp="1"/>
+          </p:cNvSpPr>
+          <p:nvPr>
+            <p:ph type="sldNum" sz="quarter" idx="12"/>
+          </p:nvPr>
+        </p:nvSpPr>
+        <p:spPr/>
+        <p:txBody>
+          <a:bodyPr/>
+          <a:lstStyle/>
+          <a:p>
+            <a:fld id="{3283F836-7072-4261-ABB3-ED9F6EF4964D}" type="slidenum">
+              <a:rPr lang="vi-VN" smtClean="0"/>
+              <a:t>11</a:t>
+            </a:fld>
+            <a:endParaRPr lang="vi-VN"/>
+          </a:p>
+        </p:txBody>
+      </p:sp>
+    </p:spTree>
+    <p:extLst>
+      <p:ext uri="{BB962C8B-B14F-4D97-AF65-F5344CB8AC3E}">
+        <p14:creationId xmlns:p14="http://schemas.microsoft.com/office/powerpoint/2010/main" val="1935174923"/>
+      </p:ext>
+    </p:extLst>
+  </p:cSld>
+  <p:clrMapOvr>
+    <a:masterClrMapping/>
+  </p:clrMapOvr>
+</p:sld>
+</file>
+
+<file path=ppt/slides/slide12.xml><?xml version="1.0" encoding="utf-8"?>
+<p:sld xmlns:a="http://schemas.openxmlformats.org/drawingml/2006/main" xmlns:r="http://schemas.openxmlformats.org/officeDocument/2006/relationships" xmlns:p="http://schemas.openxmlformats.org/presentationml/2006/main">
+  <p:cSld>
+    <p:spTree>
+      <p:nvGrpSpPr>
+        <p:cNvPr id="1" name=""/>
+        <p:cNvGrpSpPr/>
+        <p:nvPr/>
+      </p:nvGrpSpPr>
+      <p:grpSpPr>
+        <a:xfrm>
+          <a:off x="0" y="0"/>
+          <a:ext cx="0" cy="0"/>
+          <a:chOff x="0" y="0"/>
+          <a:chExt cx="0" cy="0"/>
+        </a:xfrm>
+      </p:grpSpPr>
+      <p:sp>
+        <p:nvSpPr>
+          <p:cNvPr id="2" name="Title 1"/>
+          <p:cNvSpPr>
+            <a:spLocks noGrp="1"/>
+          </p:cNvSpPr>
+          <p:nvPr>
+            <p:ph type="title"/>
+          </p:nvPr>
+        </p:nvSpPr>
+        <p:spPr/>
+        <p:txBody>
+          <a:bodyPr/>
+          <a:lstStyle/>
+          <a:p>
+            <a:r>
+              <a:rPr lang="en-US" dirty="0" err="1" smtClean="0"/>
+              <a:t>Xóa</a:t>
+            </a:r>
+            <a:r>
+              <a:rPr lang="en-US" dirty="0" smtClean="0"/>
+              <a:t> </a:t>
+            </a:r>
+            <a:r>
+              <a:rPr lang="en-US" dirty="0" err="1" smtClean="0"/>
+              <a:t>mặt</a:t>
+            </a:r>
+            <a:r>
+              <a:rPr lang="en-US" dirty="0" smtClean="0"/>
+              <a:t> </a:t>
+            </a:r>
+            <a:r>
+              <a:rPr lang="en-US" dirty="0" err="1" smtClean="0"/>
+              <a:t>hàng</a:t>
+            </a:r>
+            <a:endParaRPr lang="vi-VN" dirty="0"/>
+          </a:p>
+        </p:txBody>
+      </p:sp>
+      <p:sp>
+        <p:nvSpPr>
+          <p:cNvPr id="3" name="Content Placeholder 2"/>
+          <p:cNvSpPr>
+            <a:spLocks noGrp="1"/>
+          </p:cNvSpPr>
+          <p:nvPr>
+            <p:ph idx="1"/>
+          </p:nvPr>
+        </p:nvSpPr>
+        <p:spPr/>
+        <p:txBody>
+          <a:bodyPr/>
+          <a:lstStyle/>
+          <a:p>
+            <a:r>
+              <a:rPr lang="en-US" dirty="0" err="1" smtClean="0"/>
+              <a:t>Thay</a:t>
+            </a:r>
+            <a:r>
+              <a:rPr lang="en-US" dirty="0" smtClean="0"/>
+              <a:t> </a:t>
+            </a:r>
+            <a:r>
+              <a:rPr lang="en-US" dirty="0" err="1" smtClean="0"/>
+              <a:t>vì</a:t>
+            </a:r>
+            <a:r>
+              <a:rPr lang="en-US" dirty="0" smtClean="0"/>
+              <a:t> </a:t>
+            </a:r>
+            <a:r>
+              <a:rPr lang="en-US" dirty="0" err="1" smtClean="0"/>
+              <a:t>xóa</a:t>
+            </a:r>
+            <a:r>
+              <a:rPr lang="en-US" dirty="0" smtClean="0"/>
+              <a:t> </a:t>
+            </a:r>
+            <a:r>
+              <a:rPr lang="en-US" dirty="0" err="1" smtClean="0"/>
+              <a:t>mặt</a:t>
+            </a:r>
+            <a:r>
+              <a:rPr lang="en-US" dirty="0" smtClean="0"/>
+              <a:t> </a:t>
+            </a:r>
+            <a:r>
+              <a:rPr lang="en-US" dirty="0" err="1" smtClean="0"/>
+              <a:t>hàng</a:t>
+            </a:r>
+            <a:r>
+              <a:rPr lang="en-US" dirty="0" smtClean="0"/>
+              <a:t>, </a:t>
+            </a:r>
+            <a:r>
+              <a:rPr lang="en-US" dirty="0" err="1" smtClean="0"/>
+              <a:t>điều</a:t>
+            </a:r>
+            <a:r>
+              <a:rPr lang="en-US" dirty="0" smtClean="0"/>
+              <a:t> </a:t>
+            </a:r>
+            <a:r>
+              <a:rPr lang="en-US" dirty="0" err="1" smtClean="0"/>
+              <a:t>chỉnh</a:t>
+            </a:r>
+            <a:r>
+              <a:rPr lang="en-US" dirty="0" smtClean="0"/>
+              <a:t> </a:t>
+            </a:r>
+            <a:r>
+              <a:rPr lang="en-US" dirty="0" err="1" smtClean="0"/>
+              <a:t>số</a:t>
+            </a:r>
+            <a:r>
+              <a:rPr lang="en-US" dirty="0" smtClean="0"/>
+              <a:t> </a:t>
+            </a:r>
+            <a:r>
+              <a:rPr lang="en-US" dirty="0" err="1" smtClean="0"/>
+              <a:t>lượng</a:t>
+            </a:r>
+            <a:r>
+              <a:rPr lang="en-US" dirty="0" smtClean="0"/>
+              <a:t> </a:t>
+            </a:r>
+            <a:r>
+              <a:rPr lang="en-US" dirty="0" err="1" smtClean="0"/>
+              <a:t>mặt</a:t>
+            </a:r>
+            <a:r>
+              <a:rPr lang="en-US" dirty="0" smtClean="0"/>
+              <a:t> </a:t>
+            </a:r>
+            <a:r>
+              <a:rPr lang="en-US" dirty="0" err="1" smtClean="0"/>
+              <a:t>hàng</a:t>
+            </a:r>
+            <a:r>
+              <a:rPr lang="en-US" dirty="0" smtClean="0"/>
+              <a:t> </a:t>
+            </a:r>
+            <a:r>
+              <a:rPr lang="en-US" dirty="0" err="1" smtClean="0"/>
+              <a:t>về</a:t>
+            </a:r>
+            <a:r>
+              <a:rPr lang="en-US" dirty="0" smtClean="0"/>
+              <a:t> 0</a:t>
+            </a:r>
+          </a:p>
+          <a:p>
+            <a:r>
+              <a:rPr lang="en-US" dirty="0" err="1" smtClean="0"/>
+              <a:t>Mặt</a:t>
+            </a:r>
+            <a:r>
+              <a:rPr lang="en-US" dirty="0" smtClean="0"/>
+              <a:t> </a:t>
+            </a:r>
+            <a:r>
+              <a:rPr lang="en-US" dirty="0" err="1" smtClean="0"/>
+              <a:t>hàng</a:t>
+            </a:r>
+            <a:r>
+              <a:rPr lang="en-US" dirty="0" smtClean="0"/>
+              <a:t> </a:t>
+            </a:r>
+            <a:r>
+              <a:rPr lang="en-US" dirty="0" err="1" smtClean="0"/>
+              <a:t>đã</a:t>
+            </a:r>
+            <a:r>
+              <a:rPr lang="en-US" dirty="0" smtClean="0"/>
+              <a:t> </a:t>
+            </a:r>
+            <a:r>
+              <a:rPr lang="en-US" dirty="0" err="1" smtClean="0"/>
+              <a:t>xóa</a:t>
+            </a:r>
+            <a:r>
+              <a:rPr lang="en-US" dirty="0" smtClean="0"/>
+              <a:t> </a:t>
+            </a:r>
+            <a:r>
+              <a:rPr lang="en-US" dirty="0" err="1" smtClean="0"/>
+              <a:t>sẽ</a:t>
+            </a:r>
+            <a:r>
+              <a:rPr lang="en-US" dirty="0" smtClean="0"/>
+              <a:t> </a:t>
+            </a:r>
+            <a:r>
+              <a:rPr lang="en-US" dirty="0" err="1" smtClean="0"/>
+              <a:t>không</a:t>
+            </a:r>
+            <a:r>
+              <a:rPr lang="en-US" dirty="0" smtClean="0"/>
+              <a:t> </a:t>
+            </a:r>
+            <a:r>
+              <a:rPr lang="en-US" dirty="0" err="1" smtClean="0"/>
+              <a:t>xuất</a:t>
+            </a:r>
+            <a:r>
+              <a:rPr lang="en-US" dirty="0" smtClean="0"/>
+              <a:t> </a:t>
+            </a:r>
+            <a:r>
+              <a:rPr lang="en-US" dirty="0" err="1" smtClean="0"/>
+              <a:t>hiện</a:t>
+            </a:r>
+            <a:r>
+              <a:rPr lang="en-US" dirty="0" smtClean="0"/>
+              <a:t> </a:t>
+            </a:r>
+            <a:r>
+              <a:rPr lang="en-US" dirty="0" err="1" smtClean="0"/>
+              <a:t>trong</a:t>
+            </a:r>
+            <a:r>
+              <a:rPr lang="en-US" dirty="0" smtClean="0"/>
+              <a:t> </a:t>
+            </a:r>
+            <a:r>
+              <a:rPr lang="en-US" dirty="0" err="1" smtClean="0"/>
+              <a:t>danh</a:t>
+            </a:r>
+            <a:r>
+              <a:rPr lang="en-US" dirty="0" smtClean="0"/>
+              <a:t> </a:t>
+            </a:r>
+            <a:r>
+              <a:rPr lang="en-US" dirty="0" err="1" smtClean="0"/>
+              <a:t>sách</a:t>
+            </a:r>
+            <a:r>
+              <a:rPr lang="en-US" dirty="0" smtClean="0"/>
+              <a:t> </a:t>
+            </a:r>
+            <a:r>
+              <a:rPr lang="en-US" dirty="0" err="1" smtClean="0"/>
+              <a:t>hàng</a:t>
+            </a:r>
+            <a:endParaRPr lang="en-US" dirty="0" smtClean="0"/>
+          </a:p>
+          <a:p>
+            <a:r>
+              <a:rPr lang="en-US" dirty="0" err="1" smtClean="0"/>
+              <a:t>Người</a:t>
+            </a:r>
+            <a:r>
+              <a:rPr lang="en-US" dirty="0" smtClean="0"/>
+              <a:t> </a:t>
+            </a:r>
+            <a:r>
+              <a:rPr lang="en-US" dirty="0" err="1" smtClean="0"/>
+              <a:t>dùng</a:t>
+            </a:r>
+            <a:r>
+              <a:rPr lang="en-US" dirty="0" smtClean="0"/>
+              <a:t> </a:t>
+            </a:r>
+            <a:r>
+              <a:rPr lang="en-US" dirty="0" err="1" smtClean="0"/>
+              <a:t>có</a:t>
+            </a:r>
+            <a:r>
+              <a:rPr lang="en-US" dirty="0" smtClean="0"/>
+              <a:t> </a:t>
+            </a:r>
+            <a:r>
+              <a:rPr lang="en-US" dirty="0" err="1" smtClean="0"/>
+              <a:t>thể</a:t>
+            </a:r>
+            <a:r>
+              <a:rPr lang="en-US" dirty="0" smtClean="0"/>
+              <a:t> </a:t>
+            </a:r>
+            <a:r>
+              <a:rPr lang="en-US" dirty="0" err="1" smtClean="0"/>
+              <a:t>khôi</a:t>
+            </a:r>
+            <a:r>
+              <a:rPr lang="en-US" dirty="0" smtClean="0"/>
+              <a:t> </a:t>
+            </a:r>
+            <a:r>
+              <a:rPr lang="en-US" dirty="0" err="1" smtClean="0"/>
+              <a:t>phục</a:t>
+            </a:r>
+            <a:r>
+              <a:rPr lang="en-US" dirty="0" smtClean="0"/>
+              <a:t> </a:t>
+            </a:r>
+            <a:r>
+              <a:rPr lang="en-US" dirty="0" err="1" smtClean="0"/>
+              <a:t>mặt</a:t>
+            </a:r>
+            <a:r>
+              <a:rPr lang="en-US" dirty="0" smtClean="0"/>
+              <a:t> </a:t>
+            </a:r>
+            <a:r>
+              <a:rPr lang="en-US" dirty="0" err="1" smtClean="0"/>
+              <a:t>hàng</a:t>
+            </a:r>
+            <a:r>
+              <a:rPr lang="en-US" dirty="0" smtClean="0"/>
+              <a:t> </a:t>
+            </a:r>
+            <a:r>
+              <a:rPr lang="en-US" dirty="0" err="1" smtClean="0"/>
+              <a:t>đã</a:t>
+            </a:r>
+            <a:r>
+              <a:rPr lang="en-US" dirty="0" smtClean="0"/>
+              <a:t> </a:t>
+            </a:r>
+            <a:r>
+              <a:rPr lang="en-US" dirty="0" err="1" smtClean="0"/>
+              <a:t>xóa</a:t>
+            </a:r>
+            <a:endParaRPr lang="vi-VN" dirty="0"/>
+          </a:p>
+        </p:txBody>
+      </p:sp>
+      <p:sp>
+        <p:nvSpPr>
+          <p:cNvPr id="4" name="Slide Number Placeholder 3"/>
+          <p:cNvSpPr>
+            <a:spLocks noGrp="1"/>
+          </p:cNvSpPr>
+          <p:nvPr>
+            <p:ph type="sldNum" sz="quarter" idx="12"/>
+          </p:nvPr>
+        </p:nvSpPr>
+        <p:spPr/>
+        <p:txBody>
+          <a:bodyPr/>
+          <a:lstStyle/>
+          <a:p>
+            <a:fld id="{3283F836-7072-4261-ABB3-ED9F6EF4964D}" type="slidenum">
+              <a:rPr lang="vi-VN" smtClean="0"/>
+              <a:t>12</a:t>
+            </a:fld>
+            <a:endParaRPr lang="vi-VN"/>
+          </a:p>
+        </p:txBody>
+      </p:sp>
+    </p:spTree>
+    <p:extLst>
+      <p:ext uri="{BB962C8B-B14F-4D97-AF65-F5344CB8AC3E}">
+        <p14:creationId xmlns:p14="http://schemas.microsoft.com/office/powerpoint/2010/main" val="1472940003"/>
+      </p:ext>
+    </p:extLst>
+  </p:cSld>
+  <p:clrMapOvr>
+    <a:masterClrMapping/>
+  </p:clrMapOvr>
+</p:sld>
+</file>
+
+<file path=ppt/slides/slide13.xml><?xml version="1.0" encoding="utf-8"?>
+<p:sld xmlns:a="http://schemas.openxmlformats.org/drawingml/2006/main" xmlns:r="http://schemas.openxmlformats.org/officeDocument/2006/relationships" xmlns:p="http://schemas.openxmlformats.org/presentationml/2006/main">
+  <p:cSld>
+    <p:spTree>
+      <p:nvGrpSpPr>
+        <p:cNvPr id="1" name=""/>
+        <p:cNvGrpSpPr/>
+        <p:nvPr/>
+      </p:nvGrpSpPr>
+      <p:grpSpPr>
+        <a:xfrm>
+          <a:off x="0" y="0"/>
+          <a:ext cx="0" cy="0"/>
+          <a:chOff x="0" y="0"/>
+          <a:chExt cx="0" cy="0"/>
+        </a:xfrm>
+      </p:grpSpPr>
+      <p:sp>
+        <p:nvSpPr>
+          <p:cNvPr id="2" name="Title 1"/>
+          <p:cNvSpPr>
+            <a:spLocks noGrp="1"/>
+          </p:cNvSpPr>
+          <p:nvPr>
+            <p:ph type="title"/>
+          </p:nvPr>
+        </p:nvSpPr>
+        <p:spPr/>
+        <p:txBody>
+          <a:bodyPr/>
+          <a:lstStyle/>
+          <a:p>
+            <a:r>
+              <a:rPr lang="en-US" dirty="0" err="1" smtClean="0"/>
               <a:t>Nhập</a:t>
             </a:r>
             <a:r>
@@ -4618,7 +5409,7 @@
           <a:p>
             <a:fld id="{3283F836-7072-4261-ABB3-ED9F6EF4964D}" type="slidenum">
               <a:rPr lang="vi-VN" smtClean="0"/>
-              <a:t>11</a:t>
+              <a:t>13</a:t>
             </a:fld>
             <a:endParaRPr lang="vi-VN"/>
           </a:p>
@@ -4848,540 +5639,6 @@
 </p:sld>
 </file>
 
-<file path=ppt/slides/slide12.xml><?xml version="1.0" encoding="utf-8"?>
-<p:sld xmlns:a="http://schemas.openxmlformats.org/drawingml/2006/main" xmlns:r="http://schemas.openxmlformats.org/officeDocument/2006/relationships" xmlns:p="http://schemas.openxmlformats.org/presentationml/2006/main">
-  <p:cSld>
-    <p:spTree>
-      <p:nvGrpSpPr>
-        <p:cNvPr id="1" name=""/>
-        <p:cNvGrpSpPr/>
-        <p:nvPr/>
-      </p:nvGrpSpPr>
-      <p:grpSpPr>
-        <a:xfrm>
-          <a:off x="0" y="0"/>
-          <a:ext cx="0" cy="0"/>
-          <a:chOff x="0" y="0"/>
-          <a:chExt cx="0" cy="0"/>
-        </a:xfrm>
-      </p:grpSpPr>
-      <p:sp>
-        <p:nvSpPr>
-          <p:cNvPr id="2" name="Title 1"/>
-          <p:cNvSpPr>
-            <a:spLocks noGrp="1"/>
-          </p:cNvSpPr>
-          <p:nvPr>
-            <p:ph type="title"/>
-          </p:nvPr>
-        </p:nvSpPr>
-        <p:spPr/>
-        <p:txBody>
-          <a:bodyPr/>
-          <a:lstStyle/>
-          <a:p>
-            <a:r>
-              <a:rPr lang="en-US" dirty="0" smtClean="0"/>
-              <a:t>2.2  </a:t>
-            </a:r>
-            <a:r>
-              <a:rPr lang="en-US" dirty="0" err="1" smtClean="0"/>
-              <a:t>Cơ</a:t>
-            </a:r>
-            <a:r>
-              <a:rPr lang="en-US" dirty="0" smtClean="0"/>
-              <a:t> </a:t>
-            </a:r>
-            <a:r>
-              <a:rPr lang="en-US" dirty="0" err="1" smtClean="0"/>
-              <a:t>sở</a:t>
-            </a:r>
-            <a:r>
-              <a:rPr lang="en-US" dirty="0" smtClean="0"/>
-              <a:t> </a:t>
-            </a:r>
-            <a:r>
-              <a:rPr lang="en-US" dirty="0" err="1" smtClean="0"/>
-              <a:t>dữ</a:t>
-            </a:r>
-            <a:r>
-              <a:rPr lang="en-US" dirty="0" smtClean="0"/>
-              <a:t> </a:t>
-            </a:r>
-            <a:r>
-              <a:rPr lang="en-US" dirty="0" err="1" smtClean="0"/>
-              <a:t>liệu</a:t>
-            </a:r>
-            <a:endParaRPr lang="vi-VN" dirty="0"/>
-          </a:p>
-        </p:txBody>
-      </p:sp>
-      <p:sp>
-        <p:nvSpPr>
-          <p:cNvPr id="3" name="Content Placeholder 2"/>
-          <p:cNvSpPr>
-            <a:spLocks noGrp="1"/>
-          </p:cNvSpPr>
-          <p:nvPr>
-            <p:ph idx="1"/>
-          </p:nvPr>
-        </p:nvSpPr>
-        <p:spPr/>
-        <p:txBody>
-          <a:bodyPr/>
-          <a:lstStyle/>
-          <a:p>
-            <a:r>
-              <a:rPr lang="en-US" dirty="0" err="1" smtClean="0"/>
-              <a:t>Có</a:t>
-            </a:r>
-            <a:r>
-              <a:rPr lang="en-US" dirty="0" smtClean="0"/>
-              <a:t> </a:t>
-            </a:r>
-            <a:r>
-              <a:rPr lang="en-US" dirty="0" smtClean="0"/>
-              <a:t>4 </a:t>
-            </a:r>
-            <a:r>
-              <a:rPr lang="en-US" dirty="0" err="1" smtClean="0"/>
-              <a:t>bảng</a:t>
-            </a:r>
-            <a:r>
-              <a:rPr lang="en-US" dirty="0" smtClean="0"/>
-              <a:t>:</a:t>
-            </a:r>
-          </a:p>
-          <a:p>
-            <a:pPr lvl="1">
-              <a:buFont typeface="Arial" panose="020B0604020202020204" pitchFamily="34" charset="0"/>
-              <a:buChar char="•"/>
-            </a:pPr>
-            <a:r>
-              <a:rPr lang="en-US" dirty="0" smtClean="0"/>
-              <a:t>SANPHAM </a:t>
-            </a:r>
-          </a:p>
-          <a:p>
-            <a:pPr lvl="1">
-              <a:buFont typeface="Arial" panose="020B0604020202020204" pitchFamily="34" charset="0"/>
-              <a:buChar char="•"/>
-            </a:pPr>
-            <a:r>
-              <a:rPr lang="en-US" dirty="0" smtClean="0"/>
-              <a:t>NHANVIEN</a:t>
-            </a:r>
-          </a:p>
-          <a:p>
-            <a:pPr lvl="1">
-              <a:buFont typeface="Arial" panose="020B0604020202020204" pitchFamily="34" charset="0"/>
-              <a:buChar char="•"/>
-            </a:pPr>
-            <a:r>
-              <a:rPr lang="en-US" dirty="0" smtClean="0"/>
-              <a:t>HOADON</a:t>
-            </a:r>
-          </a:p>
-          <a:p>
-            <a:pPr lvl="1">
-              <a:buFont typeface="Arial" panose="020B0604020202020204" pitchFamily="34" charset="0"/>
-              <a:buChar char="•"/>
-            </a:pPr>
-            <a:r>
-              <a:rPr lang="en-US" dirty="0" smtClean="0"/>
-              <a:t>CT_HOADON</a:t>
-            </a:r>
-          </a:p>
-          <a:p>
-            <a:pPr>
-              <a:buFont typeface="Wingdings" panose="05000000000000000000" pitchFamily="2" charset="2"/>
-              <a:buChar char="§"/>
-            </a:pPr>
-            <a:r>
-              <a:rPr lang="en-US" dirty="0" err="1" smtClean="0"/>
-              <a:t>Có</a:t>
-            </a:r>
-            <a:r>
-              <a:rPr lang="en-US" dirty="0" smtClean="0"/>
-              <a:t> </a:t>
-            </a:r>
-            <a:r>
-              <a:rPr lang="en-US" dirty="0" err="1" smtClean="0"/>
-              <a:t>liên</a:t>
-            </a:r>
-            <a:r>
-              <a:rPr lang="en-US" dirty="0" smtClean="0"/>
-              <a:t> </a:t>
-            </a:r>
-            <a:r>
-              <a:rPr lang="en-US" dirty="0" err="1" smtClean="0"/>
-              <a:t>kết</a:t>
-            </a:r>
-            <a:r>
-              <a:rPr lang="en-US" dirty="0" smtClean="0"/>
-              <a:t> </a:t>
-            </a:r>
-            <a:r>
-              <a:rPr lang="en-US" dirty="0" err="1" smtClean="0"/>
-              <a:t>khóa</a:t>
-            </a:r>
-            <a:endParaRPr lang="en-US" dirty="0" smtClean="0"/>
-          </a:p>
-          <a:p>
-            <a:pPr>
-              <a:buFont typeface="Wingdings" panose="05000000000000000000" pitchFamily="2" charset="2"/>
-              <a:buChar char="§"/>
-            </a:pPr>
-            <a:r>
-              <a:rPr lang="en-US" dirty="0" err="1" smtClean="0"/>
-              <a:t>Có</a:t>
-            </a:r>
-            <a:r>
-              <a:rPr lang="en-US" dirty="0" smtClean="0"/>
-              <a:t> </a:t>
-            </a:r>
-            <a:r>
-              <a:rPr lang="en-US" dirty="0" err="1" smtClean="0"/>
-              <a:t>những</a:t>
-            </a:r>
-            <a:r>
-              <a:rPr lang="en-US" dirty="0" smtClean="0"/>
-              <a:t> </a:t>
-            </a:r>
-            <a:r>
-              <a:rPr lang="en-US" dirty="0" err="1" smtClean="0"/>
-              <a:t>hàm</a:t>
-            </a:r>
-            <a:r>
-              <a:rPr lang="en-US" dirty="0" smtClean="0"/>
-              <a:t> </a:t>
-            </a:r>
-            <a:r>
-              <a:rPr lang="en-US" dirty="0" err="1" smtClean="0"/>
-              <a:t>để</a:t>
-            </a:r>
-            <a:r>
-              <a:rPr lang="en-US" dirty="0" smtClean="0"/>
-              <a:t> </a:t>
-            </a:r>
-            <a:r>
-              <a:rPr lang="en-US" dirty="0" err="1" smtClean="0"/>
-              <a:t>nhập</a:t>
-            </a:r>
-            <a:r>
-              <a:rPr lang="en-US" dirty="0" smtClean="0"/>
-              <a:t> </a:t>
-            </a:r>
-            <a:r>
-              <a:rPr lang="en-US" dirty="0" err="1" smtClean="0"/>
-              <a:t>thông</a:t>
-            </a:r>
-            <a:r>
-              <a:rPr lang="en-US" dirty="0" smtClean="0"/>
-              <a:t> tin, </a:t>
-            </a:r>
-            <a:r>
-              <a:rPr lang="en-US" dirty="0" err="1" smtClean="0"/>
-              <a:t>tránh</a:t>
-            </a:r>
-            <a:r>
-              <a:rPr lang="en-US" dirty="0" smtClean="0"/>
-              <a:t> </a:t>
-            </a:r>
-            <a:r>
-              <a:rPr lang="en-US" dirty="0" err="1" smtClean="0"/>
-              <a:t>lỗi</a:t>
-            </a:r>
-            <a:r>
-              <a:rPr lang="en-US" dirty="0" smtClean="0"/>
-              <a:t> Injection</a:t>
-            </a:r>
-          </a:p>
-          <a:p>
-            <a:pPr marL="45720" indent="0">
-              <a:buNone/>
-            </a:pPr>
-            <a:endParaRPr lang="en-US" dirty="0" smtClean="0"/>
-          </a:p>
-          <a:p>
-            <a:pPr lvl="1"/>
-            <a:endParaRPr lang="vi-VN" dirty="0"/>
-          </a:p>
-        </p:txBody>
-      </p:sp>
-      <p:sp>
-        <p:nvSpPr>
-          <p:cNvPr id="4" name="Slide Number Placeholder 3"/>
-          <p:cNvSpPr>
-            <a:spLocks noGrp="1"/>
-          </p:cNvSpPr>
-          <p:nvPr>
-            <p:ph type="sldNum" sz="quarter" idx="12"/>
-          </p:nvPr>
-        </p:nvSpPr>
-        <p:spPr/>
-        <p:txBody>
-          <a:bodyPr/>
-          <a:lstStyle/>
-          <a:p>
-            <a:fld id="{3283F836-7072-4261-ABB3-ED9F6EF4964D}" type="slidenum">
-              <a:rPr lang="vi-VN" smtClean="0"/>
-              <a:t>12</a:t>
-            </a:fld>
-            <a:endParaRPr lang="vi-VN"/>
-          </a:p>
-        </p:txBody>
-      </p:sp>
-    </p:spTree>
-    <p:extLst>
-      <p:ext uri="{BB962C8B-B14F-4D97-AF65-F5344CB8AC3E}">
-        <p14:creationId xmlns:p14="http://schemas.microsoft.com/office/powerpoint/2010/main" val="366487702"/>
-      </p:ext>
-    </p:extLst>
-  </p:cSld>
-  <p:clrMapOvr>
-    <a:masterClrMapping/>
-  </p:clrMapOvr>
-</p:sld>
-</file>
-
-<file path=ppt/slides/slide13.xml><?xml version="1.0" encoding="utf-8"?>
-<p:sld xmlns:a="http://schemas.openxmlformats.org/drawingml/2006/main" xmlns:r="http://schemas.openxmlformats.org/officeDocument/2006/relationships" xmlns:p="http://schemas.openxmlformats.org/presentationml/2006/main">
-  <p:cSld>
-    <p:spTree>
-      <p:nvGrpSpPr>
-        <p:cNvPr id="1" name=""/>
-        <p:cNvGrpSpPr/>
-        <p:nvPr/>
-      </p:nvGrpSpPr>
-      <p:grpSpPr>
-        <a:xfrm>
-          <a:off x="0" y="0"/>
-          <a:ext cx="0" cy="0"/>
-          <a:chOff x="0" y="0"/>
-          <a:chExt cx="0" cy="0"/>
-        </a:xfrm>
-      </p:grpSpPr>
-      <p:sp>
-        <p:nvSpPr>
-          <p:cNvPr id="2" name="Title 1"/>
-          <p:cNvSpPr>
-            <a:spLocks noGrp="1"/>
-          </p:cNvSpPr>
-          <p:nvPr>
-            <p:ph type="title"/>
-          </p:nvPr>
-        </p:nvSpPr>
-        <p:spPr/>
-        <p:txBody>
-          <a:bodyPr/>
-          <a:lstStyle/>
-          <a:p>
-            <a:r>
-              <a:rPr lang="en-US" dirty="0" smtClean="0"/>
-              <a:t>2.3  </a:t>
-            </a:r>
-            <a:r>
-              <a:rPr lang="en-US" dirty="0" err="1" smtClean="0"/>
-              <a:t>Giao</a:t>
-            </a:r>
-            <a:r>
-              <a:rPr lang="en-US" dirty="0" smtClean="0"/>
-              <a:t> </a:t>
-            </a:r>
-            <a:r>
-              <a:rPr lang="en-US" dirty="0" err="1" smtClean="0"/>
-              <a:t>diện</a:t>
-            </a:r>
-            <a:endParaRPr lang="vi-VN" dirty="0"/>
-          </a:p>
-        </p:txBody>
-      </p:sp>
-      <p:sp>
-        <p:nvSpPr>
-          <p:cNvPr id="3" name="Content Placeholder 2"/>
-          <p:cNvSpPr>
-            <a:spLocks noGrp="1"/>
-          </p:cNvSpPr>
-          <p:nvPr>
-            <p:ph idx="1"/>
-          </p:nvPr>
-        </p:nvSpPr>
-        <p:spPr/>
-        <p:txBody>
-          <a:bodyPr/>
-          <a:lstStyle/>
-          <a:p>
-            <a:r>
-              <a:rPr lang="en-US" dirty="0" err="1" smtClean="0"/>
-              <a:t>Nhiều</a:t>
-            </a:r>
-            <a:r>
-              <a:rPr lang="en-US" dirty="0" smtClean="0"/>
-              <a:t> </a:t>
-            </a:r>
-            <a:r>
-              <a:rPr lang="en-US" dirty="0" err="1" smtClean="0"/>
-              <a:t>hình</a:t>
-            </a:r>
-            <a:r>
-              <a:rPr lang="en-US" dirty="0" smtClean="0"/>
-              <a:t> </a:t>
-            </a:r>
-            <a:r>
-              <a:rPr lang="en-US" dirty="0" err="1" smtClean="0"/>
-              <a:t>ảnh</a:t>
-            </a:r>
-            <a:endParaRPr lang="en-US" dirty="0" smtClean="0"/>
-          </a:p>
-          <a:p>
-            <a:r>
-              <a:rPr lang="en-US" dirty="0" err="1" smtClean="0"/>
-              <a:t>Dễ</a:t>
-            </a:r>
-            <a:r>
-              <a:rPr lang="en-US" dirty="0" smtClean="0"/>
-              <a:t> </a:t>
-            </a:r>
-            <a:r>
-              <a:rPr lang="en-US" dirty="0" err="1" smtClean="0"/>
-              <a:t>hiểu</a:t>
-            </a:r>
-            <a:r>
-              <a:rPr lang="en-US" dirty="0" smtClean="0"/>
-              <a:t>, </a:t>
-            </a:r>
-            <a:r>
-              <a:rPr lang="en-US" dirty="0" err="1" smtClean="0"/>
-              <a:t>dễ</a:t>
-            </a:r>
-            <a:r>
-              <a:rPr lang="en-US" dirty="0" smtClean="0"/>
-              <a:t> </a:t>
-            </a:r>
-            <a:r>
-              <a:rPr lang="en-US" dirty="0" err="1" smtClean="0"/>
-              <a:t>sử</a:t>
-            </a:r>
-            <a:r>
-              <a:rPr lang="en-US" dirty="0" smtClean="0"/>
-              <a:t> </a:t>
-            </a:r>
-            <a:r>
-              <a:rPr lang="en-US" dirty="0" err="1" smtClean="0"/>
-              <a:t>dụng</a:t>
-            </a:r>
-            <a:endParaRPr lang="en-US" dirty="0" smtClean="0"/>
-          </a:p>
-          <a:p>
-            <a:r>
-              <a:rPr lang="en-US" dirty="0" err="1" smtClean="0"/>
-              <a:t>Có</a:t>
-            </a:r>
-            <a:r>
-              <a:rPr lang="en-US" dirty="0" smtClean="0"/>
-              <a:t> </a:t>
-            </a:r>
-            <a:r>
-              <a:rPr lang="en-US" dirty="0" err="1" smtClean="0"/>
-              <a:t>tất</a:t>
-            </a:r>
-            <a:r>
-              <a:rPr lang="en-US" dirty="0" smtClean="0"/>
-              <a:t> </a:t>
-            </a:r>
-            <a:r>
-              <a:rPr lang="en-US" dirty="0" err="1" smtClean="0"/>
-              <a:t>cả</a:t>
-            </a:r>
-            <a:r>
-              <a:rPr lang="en-US" dirty="0" smtClean="0"/>
-              <a:t> </a:t>
-            </a:r>
-            <a:r>
-              <a:rPr lang="en-US" dirty="0" err="1" smtClean="0"/>
-              <a:t>các</a:t>
-            </a:r>
-            <a:r>
-              <a:rPr lang="en-US" dirty="0" smtClean="0"/>
-              <a:t> </a:t>
-            </a:r>
-            <a:r>
-              <a:rPr lang="en-US" dirty="0" err="1" smtClean="0"/>
-              <a:t>chức</a:t>
-            </a:r>
-            <a:r>
-              <a:rPr lang="en-US" dirty="0" smtClean="0"/>
-              <a:t> </a:t>
-            </a:r>
-            <a:r>
-              <a:rPr lang="en-US" dirty="0" err="1" smtClean="0"/>
-              <a:t>năng</a:t>
-            </a:r>
-            <a:r>
-              <a:rPr lang="en-US" dirty="0" smtClean="0"/>
-              <a:t> </a:t>
-            </a:r>
-            <a:r>
-              <a:rPr lang="en-US" dirty="0" err="1" smtClean="0"/>
-              <a:t>của</a:t>
-            </a:r>
-            <a:r>
-              <a:rPr lang="en-US" dirty="0" smtClean="0"/>
-              <a:t> </a:t>
-            </a:r>
-            <a:r>
-              <a:rPr lang="en-US" dirty="0" err="1" smtClean="0"/>
-              <a:t>chương</a:t>
-            </a:r>
-            <a:r>
-              <a:rPr lang="en-US" dirty="0" smtClean="0"/>
-              <a:t> </a:t>
-            </a:r>
-            <a:r>
-              <a:rPr lang="en-US" dirty="0" err="1" smtClean="0"/>
-              <a:t>trình</a:t>
-            </a:r>
-            <a:endParaRPr lang="en-US" dirty="0" smtClean="0"/>
-          </a:p>
-        </p:txBody>
-      </p:sp>
-      <p:sp>
-        <p:nvSpPr>
-          <p:cNvPr id="4" name="Slide Number Placeholder 3"/>
-          <p:cNvSpPr>
-            <a:spLocks noGrp="1"/>
-          </p:cNvSpPr>
-          <p:nvPr>
-            <p:ph type="sldNum" sz="quarter" idx="12"/>
-          </p:nvPr>
-        </p:nvSpPr>
-        <p:spPr/>
-        <p:txBody>
-          <a:bodyPr/>
-          <a:lstStyle/>
-          <a:p>
-            <a:fld id="{3283F836-7072-4261-ABB3-ED9F6EF4964D}" type="slidenum">
-              <a:rPr lang="vi-VN" smtClean="0"/>
-              <a:t>13</a:t>
-            </a:fld>
-            <a:endParaRPr lang="vi-VN"/>
-          </a:p>
-        </p:txBody>
-      </p:sp>
-    </p:spTree>
-    <p:extLst>
-      <p:ext uri="{BB962C8B-B14F-4D97-AF65-F5344CB8AC3E}">
-        <p14:creationId xmlns:p14="http://schemas.microsoft.com/office/powerpoint/2010/main" val="1008592072"/>
-      </p:ext>
-    </p:extLst>
-  </p:cSld>
-  <p:clrMapOvr>
-    <a:masterClrMapping/>
-  </p:clrMapOvr>
-</p:sld>
-</file>
-
 <file path=ppt/slides/slide14.xml><?xml version="1.0" encoding="utf-8"?>
 <p:sld xmlns:a="http://schemas.openxmlformats.org/drawingml/2006/main" xmlns:r="http://schemas.openxmlformats.org/officeDocument/2006/relationships" xmlns:p="http://schemas.openxmlformats.org/presentationml/2006/main">
   <p:cSld>
@@ -5399,35 +5656,246 @@
           <a:chExt cx="0" cy="0"/>
         </a:xfrm>
       </p:grpSpPr>
-      <p:pic>
-        <p:nvPicPr>
-          <p:cNvPr id="5" name="Content Placeholder 4"/>
-          <p:cNvPicPr>
-            <a:picLocks noGrp="1" noChangeAspect="1"/>
-          </p:cNvPicPr>
+      <p:sp>
+        <p:nvSpPr>
+          <p:cNvPr id="2" name="Title 1"/>
+          <p:cNvSpPr>
+            <a:spLocks noGrp="1"/>
+          </p:cNvSpPr>
+          <p:nvPr>
+            <p:ph type="title"/>
+          </p:nvPr>
+        </p:nvSpPr>
+        <p:spPr/>
+        <p:txBody>
+          <a:bodyPr/>
+          <a:lstStyle/>
+          <a:p>
+            <a:r>
+              <a:rPr lang="en-US" dirty="0" smtClean="0"/>
+              <a:t>2.3  </a:t>
+            </a:r>
+            <a:r>
+              <a:rPr lang="en-US" dirty="0" err="1" smtClean="0"/>
+              <a:t>Cơ</a:t>
+            </a:r>
+            <a:r>
+              <a:rPr lang="en-US" dirty="0" smtClean="0"/>
+              <a:t> </a:t>
+            </a:r>
+            <a:r>
+              <a:rPr lang="en-US" dirty="0" err="1" smtClean="0"/>
+              <a:t>sở</a:t>
+            </a:r>
+            <a:r>
+              <a:rPr lang="en-US" dirty="0" smtClean="0"/>
+              <a:t> </a:t>
+            </a:r>
+            <a:r>
+              <a:rPr lang="en-US" dirty="0" err="1" smtClean="0"/>
+              <a:t>dữ</a:t>
+            </a:r>
+            <a:r>
+              <a:rPr lang="en-US" dirty="0" smtClean="0"/>
+              <a:t> </a:t>
+            </a:r>
+            <a:r>
+              <a:rPr lang="en-US" dirty="0" err="1" smtClean="0"/>
+              <a:t>liệu</a:t>
+            </a:r>
+            <a:endParaRPr lang="vi-VN" dirty="0"/>
+          </a:p>
+        </p:txBody>
+      </p:sp>
+      <p:sp>
+        <p:nvSpPr>
+          <p:cNvPr id="3" name="Content Placeholder 2"/>
+          <p:cNvSpPr>
+            <a:spLocks noGrp="1"/>
+          </p:cNvSpPr>
           <p:nvPr>
             <p:ph idx="1"/>
           </p:nvPr>
-        </p:nvPicPr>
-        <p:blipFill>
-          <a:blip r:embed="rId2">
-            <a:extLst>
-              <a:ext uri="{28A0092B-C50C-407E-A947-70E740481C1C}">
-                <a14:useLocalDpi xmlns:a14="http://schemas.microsoft.com/office/drawing/2010/main" val="0"/>
-              </a:ext>
-            </a:extLst>
-          </a:blip>
-          <a:stretch>
-            <a:fillRect/>
-          </a:stretch>
-        </p:blipFill>
-        <p:spPr>
-          <a:xfrm>
-            <a:off x="1259632" y="332656"/>
-            <a:ext cx="6408712" cy="6229625"/>
-          </a:xfrm>
-        </p:spPr>
-      </p:pic>
+        </p:nvSpPr>
+        <p:spPr/>
+        <p:txBody>
+          <a:bodyPr/>
+          <a:lstStyle/>
+          <a:p>
+            <a:r>
+              <a:rPr lang="en-US" dirty="0" err="1" smtClean="0"/>
+              <a:t>Có</a:t>
+            </a:r>
+            <a:r>
+              <a:rPr lang="en-US" dirty="0" smtClean="0"/>
+              <a:t> 4 </a:t>
+            </a:r>
+            <a:r>
+              <a:rPr lang="en-US" dirty="0" err="1" smtClean="0"/>
+              <a:t>bảng</a:t>
+            </a:r>
+            <a:r>
+              <a:rPr lang="en-US" dirty="0" smtClean="0"/>
+              <a:t>:</a:t>
+            </a:r>
+          </a:p>
+          <a:p>
+            <a:pPr lvl="1">
+              <a:buFont typeface="Arial" panose="020B0604020202020204" pitchFamily="34" charset="0"/>
+              <a:buChar char="•"/>
+            </a:pPr>
+            <a:r>
+              <a:rPr lang="en-US" dirty="0" smtClean="0"/>
+              <a:t>SANPHAM </a:t>
+            </a:r>
+          </a:p>
+          <a:p>
+            <a:pPr lvl="1">
+              <a:buFont typeface="Arial" panose="020B0604020202020204" pitchFamily="34" charset="0"/>
+              <a:buChar char="•"/>
+            </a:pPr>
+            <a:r>
+              <a:rPr lang="en-US" dirty="0" smtClean="0"/>
+              <a:t>NHANVIEN</a:t>
+            </a:r>
+          </a:p>
+          <a:p>
+            <a:pPr lvl="1">
+              <a:buFont typeface="Arial" panose="020B0604020202020204" pitchFamily="34" charset="0"/>
+              <a:buChar char="•"/>
+            </a:pPr>
+            <a:r>
+              <a:rPr lang="en-US" dirty="0" smtClean="0"/>
+              <a:t>HOADON</a:t>
+            </a:r>
+          </a:p>
+          <a:p>
+            <a:pPr lvl="1">
+              <a:buFont typeface="Arial" panose="020B0604020202020204" pitchFamily="34" charset="0"/>
+              <a:buChar char="•"/>
+            </a:pPr>
+            <a:r>
+              <a:rPr lang="en-US" dirty="0" smtClean="0"/>
+              <a:t>CT_HOADON</a:t>
+            </a:r>
+          </a:p>
+          <a:p>
+            <a:pPr>
+              <a:buFont typeface="Wingdings" panose="05000000000000000000" pitchFamily="2" charset="2"/>
+              <a:buChar char="§"/>
+            </a:pPr>
+            <a:r>
+              <a:rPr lang="en-US" dirty="0" err="1" smtClean="0"/>
+              <a:t>Có</a:t>
+            </a:r>
+            <a:r>
+              <a:rPr lang="en-US" dirty="0" smtClean="0"/>
+              <a:t> </a:t>
+            </a:r>
+            <a:r>
+              <a:rPr lang="en-US" dirty="0" err="1" smtClean="0"/>
+              <a:t>liên</a:t>
+            </a:r>
+            <a:r>
+              <a:rPr lang="en-US" dirty="0" smtClean="0"/>
+              <a:t> </a:t>
+            </a:r>
+            <a:r>
+              <a:rPr lang="en-US" dirty="0" err="1" smtClean="0"/>
+              <a:t>kết</a:t>
+            </a:r>
+            <a:r>
+              <a:rPr lang="en-US" dirty="0" smtClean="0"/>
+              <a:t> </a:t>
+            </a:r>
+            <a:r>
+              <a:rPr lang="en-US" dirty="0" err="1" smtClean="0"/>
+              <a:t>khóa</a:t>
+            </a:r>
+            <a:endParaRPr lang="en-US" dirty="0" smtClean="0"/>
+          </a:p>
+          <a:p>
+            <a:pPr>
+              <a:buFont typeface="Wingdings" panose="05000000000000000000" pitchFamily="2" charset="2"/>
+              <a:buChar char="§"/>
+            </a:pPr>
+            <a:r>
+              <a:rPr lang="en-US" dirty="0" err="1" smtClean="0"/>
+              <a:t>Có</a:t>
+            </a:r>
+            <a:r>
+              <a:rPr lang="en-US" dirty="0" smtClean="0"/>
+              <a:t> </a:t>
+            </a:r>
+            <a:r>
+              <a:rPr lang="en-US" dirty="0" err="1" smtClean="0"/>
+              <a:t>những</a:t>
+            </a:r>
+            <a:r>
+              <a:rPr lang="en-US" dirty="0" smtClean="0"/>
+              <a:t> </a:t>
+            </a:r>
+            <a:r>
+              <a:rPr lang="en-US" dirty="0" err="1" smtClean="0"/>
+              <a:t>hàm</a:t>
+            </a:r>
+            <a:r>
+              <a:rPr lang="en-US" dirty="0" smtClean="0"/>
+              <a:t> </a:t>
+            </a:r>
+            <a:r>
+              <a:rPr lang="en-US" dirty="0" err="1" smtClean="0"/>
+              <a:t>để</a:t>
+            </a:r>
+            <a:r>
+              <a:rPr lang="en-US" dirty="0" smtClean="0"/>
+              <a:t> </a:t>
+            </a:r>
+            <a:r>
+              <a:rPr lang="en-US" dirty="0" err="1" smtClean="0"/>
+              <a:t>nhập</a:t>
+            </a:r>
+            <a:r>
+              <a:rPr lang="en-US" dirty="0" smtClean="0"/>
+              <a:t> </a:t>
+            </a:r>
+            <a:r>
+              <a:rPr lang="en-US" dirty="0" err="1" smtClean="0"/>
+              <a:t>thông</a:t>
+            </a:r>
+            <a:r>
+              <a:rPr lang="en-US" dirty="0" smtClean="0"/>
+              <a:t> tin, </a:t>
+            </a:r>
+            <a:r>
+              <a:rPr lang="en-US" dirty="0" err="1" smtClean="0"/>
+              <a:t>tránh</a:t>
+            </a:r>
+            <a:r>
+              <a:rPr lang="en-US" dirty="0" smtClean="0"/>
+              <a:t> </a:t>
+            </a:r>
+            <a:r>
+              <a:rPr lang="en-US" dirty="0" err="1" smtClean="0"/>
+              <a:t>lỗi</a:t>
+            </a:r>
+            <a:r>
+              <a:rPr lang="en-US" dirty="0" smtClean="0"/>
+              <a:t> Injection</a:t>
+            </a:r>
+          </a:p>
+          <a:p>
+            <a:pPr marL="45720" indent="0">
+              <a:buNone/>
+            </a:pPr>
+            <a:endParaRPr lang="en-US" dirty="0" smtClean="0"/>
+          </a:p>
+          <a:p>
+            <a:pPr lvl="1"/>
+            <a:endParaRPr lang="vi-VN" dirty="0"/>
+          </a:p>
+        </p:txBody>
+      </p:sp>
       <p:sp>
         <p:nvSpPr>
           <p:cNvPr id="4" name="Slide Number Placeholder 3"/>
@@ -5454,7 +5922,7 @@
     </p:spTree>
     <p:extLst>
       <p:ext uri="{BB962C8B-B14F-4D97-AF65-F5344CB8AC3E}">
-        <p14:creationId xmlns:p14="http://schemas.microsoft.com/office/powerpoint/2010/main" val="698511112"/>
+        <p14:creationId xmlns:p14="http://schemas.microsoft.com/office/powerpoint/2010/main" val="366487702"/>
       </p:ext>
     </p:extLst>
   </p:cSld>
@@ -5481,44 +5949,35 @@
           <a:chExt cx="0" cy="0"/>
         </a:xfrm>
       </p:grpSpPr>
-      <p:sp>
-        <p:nvSpPr>
-          <p:cNvPr id="2" name="Title 1"/>
-          <p:cNvSpPr>
-            <a:spLocks noGrp="1"/>
-          </p:cNvSpPr>
-          <p:nvPr>
-            <p:ph type="title"/>
-          </p:nvPr>
-        </p:nvSpPr>
-        <p:spPr/>
-        <p:txBody>
-          <a:bodyPr/>
-          <a:lstStyle/>
-          <a:p>
-            <a:endParaRPr lang="vi-VN" dirty="0"/>
-          </a:p>
-        </p:txBody>
-      </p:sp>
-      <p:sp>
-        <p:nvSpPr>
-          <p:cNvPr id="3" name="Content Placeholder 2"/>
-          <p:cNvSpPr>
-            <a:spLocks noGrp="1"/>
-          </p:cNvSpPr>
+      <p:pic>
+        <p:nvPicPr>
+          <p:cNvPr id="5" name="Content Placeholder 4"/>
+          <p:cNvPicPr>
+            <a:picLocks noGrp="1" noChangeAspect="1"/>
+          </p:cNvPicPr>
           <p:nvPr>
             <p:ph idx="1"/>
           </p:nvPr>
-        </p:nvSpPr>
-        <p:spPr/>
-        <p:txBody>
-          <a:bodyPr/>
-          <a:lstStyle/>
-          <a:p>
-            <a:endParaRPr lang="vi-VN"/>
-          </a:p>
-        </p:txBody>
-      </p:sp>
+        </p:nvPicPr>
+        <p:blipFill>
+          <a:blip r:embed="rId2">
+            <a:extLst>
+              <a:ext uri="{28A0092B-C50C-407E-A947-70E740481C1C}">
+                <a14:useLocalDpi xmlns:a14="http://schemas.microsoft.com/office/drawing/2010/main" val="0"/>
+              </a:ext>
+            </a:extLst>
+          </a:blip>
+          <a:stretch>
+            <a:fillRect/>
+          </a:stretch>
+        </p:blipFill>
+        <p:spPr>
+          <a:xfrm>
+            <a:off x="251520" y="332656"/>
+            <a:ext cx="6408712" cy="6229625"/>
+          </a:xfrm>
+        </p:spPr>
+      </p:pic>
       <p:sp>
         <p:nvSpPr>
           <p:cNvPr id="4" name="Slide Number Placeholder 3"/>
@@ -5542,10 +6001,96 @@
           </a:p>
         </p:txBody>
       </p:sp>
+      <p:sp>
+        <p:nvSpPr>
+          <p:cNvPr id="2" name="TextBox 1"/>
+          <p:cNvSpPr txBox="1"/>
+          <p:nvPr/>
+        </p:nvSpPr>
+        <p:spPr>
+          <a:xfrm>
+            <a:off x="6848912" y="5517232"/>
+            <a:ext cx="1872208" cy="923330"/>
+          </a:xfrm>
+          <a:prstGeom prst="rect">
+            <a:avLst/>
+          </a:prstGeom>
+          <a:noFill/>
+        </p:spPr>
+        <p:txBody>
+          <a:bodyPr wrap="square" rtlCol="0">
+            <a:spAutoFit/>
+          </a:bodyPr>
+          <a:lstStyle/>
+          <a:p>
+            <a:r>
+              <a:rPr lang="en-US" dirty="0" err="1" smtClean="0"/>
+              <a:t>Hình</a:t>
+            </a:r>
+            <a:r>
+              <a:rPr lang="en-US" dirty="0" smtClean="0"/>
+              <a:t> 2.2.1Cấu </a:t>
+            </a:r>
+            <a:r>
+              <a:rPr lang="en-US" dirty="0" err="1" smtClean="0"/>
+              <a:t>tạo</a:t>
+            </a:r>
+            <a:r>
+              <a:rPr lang="en-US" dirty="0" smtClean="0"/>
+              <a:t> 4 </a:t>
+            </a:r>
+            <a:r>
+              <a:rPr lang="en-US" dirty="0" err="1" smtClean="0"/>
+              <a:t>bảng</a:t>
+            </a:r>
+            <a:r>
+              <a:rPr lang="en-US" dirty="0" smtClean="0"/>
+              <a:t> </a:t>
+            </a:r>
+            <a:r>
+              <a:rPr lang="en-US" dirty="0" err="1" smtClean="0"/>
+              <a:t>trong</a:t>
+            </a:r>
+            <a:r>
+              <a:rPr lang="en-US" dirty="0" smtClean="0"/>
+              <a:t> </a:t>
+            </a:r>
+            <a:r>
+              <a:rPr lang="en-US" dirty="0" err="1" smtClean="0"/>
+              <a:t>cơ</a:t>
+            </a:r>
+            <a:r>
+              <a:rPr lang="en-US" dirty="0" smtClean="0"/>
+              <a:t> </a:t>
+            </a:r>
+            <a:r>
+              <a:rPr lang="en-US" dirty="0" err="1" smtClean="0"/>
+              <a:t>sở</a:t>
+            </a:r>
+            <a:r>
+              <a:rPr lang="en-US" dirty="0" smtClean="0"/>
+              <a:t> </a:t>
+            </a:r>
+            <a:r>
+              <a:rPr lang="en-US" dirty="0" err="1" smtClean="0"/>
+              <a:t>dữ</a:t>
+            </a:r>
+            <a:r>
+              <a:rPr lang="en-US" dirty="0" smtClean="0"/>
+              <a:t> </a:t>
+            </a:r>
+            <a:r>
+              <a:rPr lang="en-US" dirty="0" err="1" smtClean="0"/>
+              <a:t>liệu</a:t>
+            </a:r>
+            <a:endParaRPr lang="en-US" dirty="0" smtClean="0"/>
+          </a:p>
+        </p:txBody>
+      </p:sp>
     </p:spTree>
     <p:extLst>
       <p:ext uri="{BB962C8B-B14F-4D97-AF65-F5344CB8AC3E}">
-        <p14:creationId xmlns:p14="http://schemas.microsoft.com/office/powerpoint/2010/main" val="4236625593"/>
+        <p14:creationId xmlns:p14="http://schemas.microsoft.com/office/powerpoint/2010/main" val="698511112"/>
       </p:ext>
     </p:extLst>
   </p:cSld>
@@ -5587,7 +6132,23 @@
           <a:bodyPr/>
           <a:lstStyle/>
           <a:p>
-            <a:endParaRPr lang="vi-VN"/>
+            <a:r>
+              <a:rPr lang="en-US" dirty="0" smtClean="0"/>
+              <a:t>2.4  </a:t>
+            </a:r>
+            <a:r>
+              <a:rPr lang="en-US" dirty="0" err="1" smtClean="0"/>
+              <a:t>Giao</a:t>
+            </a:r>
+            <a:r>
+              <a:rPr lang="en-US" dirty="0" smtClean="0"/>
+              <a:t> </a:t>
+            </a:r>
+            <a:r>
+              <a:rPr lang="en-US" dirty="0" err="1" smtClean="0"/>
+              <a:t>diện</a:t>
+            </a:r>
+            <a:endParaRPr lang="vi-VN" dirty="0"/>
           </a:p>
         </p:txBody>
       </p:sp>
@@ -5606,7 +6167,137 @@
           <a:bodyPr/>
           <a:lstStyle/>
           <a:p>
-            <a:endParaRPr lang="vi-VN"/>
+            <a:r>
+              <a:rPr lang="en-US" dirty="0" err="1" smtClean="0"/>
+              <a:t>Nhiều</a:t>
+            </a:r>
+            <a:r>
+              <a:rPr lang="en-US" dirty="0" smtClean="0"/>
+              <a:t> </a:t>
+            </a:r>
+            <a:r>
+              <a:rPr lang="en-US" dirty="0" err="1" smtClean="0"/>
+              <a:t>hình</a:t>
+            </a:r>
+            <a:r>
+              <a:rPr lang="en-US" dirty="0" smtClean="0"/>
+              <a:t> </a:t>
+            </a:r>
+            <a:r>
+              <a:rPr lang="en-US" dirty="0" err="1" smtClean="0"/>
+              <a:t>ảnh</a:t>
+            </a:r>
+            <a:endParaRPr lang="en-US" dirty="0" smtClean="0"/>
+          </a:p>
+          <a:p>
+            <a:r>
+              <a:rPr lang="en-US" dirty="0" err="1" smtClean="0"/>
+              <a:t>Dễ</a:t>
+            </a:r>
+            <a:r>
+              <a:rPr lang="en-US" dirty="0" smtClean="0"/>
+              <a:t> </a:t>
+            </a:r>
+            <a:r>
+              <a:rPr lang="en-US" dirty="0" err="1" smtClean="0"/>
+              <a:t>hiểu</a:t>
+            </a:r>
+            <a:r>
+              <a:rPr lang="en-US" dirty="0" smtClean="0"/>
+              <a:t>, </a:t>
+            </a:r>
+            <a:r>
+              <a:rPr lang="en-US" dirty="0" err="1" smtClean="0"/>
+              <a:t>dễ</a:t>
+            </a:r>
+            <a:r>
+              <a:rPr lang="en-US" dirty="0" smtClean="0"/>
+              <a:t> </a:t>
+            </a:r>
+            <a:r>
+              <a:rPr lang="en-US" dirty="0" err="1" smtClean="0"/>
+              <a:t>sử</a:t>
+            </a:r>
+            <a:r>
+              <a:rPr lang="en-US" dirty="0" smtClean="0"/>
+              <a:t> </a:t>
+            </a:r>
+            <a:r>
+              <a:rPr lang="en-US" dirty="0" err="1" smtClean="0"/>
+              <a:t>dụng</a:t>
+            </a:r>
+            <a:endParaRPr lang="en-US" dirty="0" smtClean="0"/>
+          </a:p>
+          <a:p>
+            <a:r>
+              <a:rPr lang="en-US" dirty="0" err="1" smtClean="0"/>
+              <a:t>Có</a:t>
+            </a:r>
+            <a:r>
+              <a:rPr lang="en-US" dirty="0" smtClean="0"/>
+              <a:t> </a:t>
+            </a:r>
+            <a:r>
+              <a:rPr lang="en-US" dirty="0" err="1" smtClean="0"/>
+              <a:t>tất</a:t>
+            </a:r>
+            <a:r>
+              <a:rPr lang="en-US" dirty="0" smtClean="0"/>
+              <a:t> </a:t>
+            </a:r>
+            <a:r>
+              <a:rPr lang="en-US" dirty="0" err="1" smtClean="0"/>
+              <a:t>cả</a:t>
+            </a:r>
+            <a:r>
+              <a:rPr lang="en-US" dirty="0" smtClean="0"/>
+              <a:t> </a:t>
+            </a:r>
+            <a:r>
+              <a:rPr lang="en-US" dirty="0" err="1" smtClean="0"/>
+              <a:t>các</a:t>
+            </a:r>
+            <a:r>
+              <a:rPr lang="en-US" dirty="0" smtClean="0"/>
+              <a:t> </a:t>
+            </a:r>
+            <a:r>
+              <a:rPr lang="en-US" dirty="0" err="1" smtClean="0"/>
+              <a:t>chức</a:t>
+            </a:r>
+            <a:r>
+              <a:rPr lang="en-US" dirty="0" smtClean="0"/>
+              <a:t> </a:t>
+            </a:r>
+            <a:r>
+              <a:rPr lang="en-US" dirty="0" err="1" smtClean="0"/>
+              <a:t>năng</a:t>
+            </a:r>
+            <a:r>
+              <a:rPr lang="en-US" dirty="0" smtClean="0"/>
+              <a:t> </a:t>
+            </a:r>
+            <a:r>
+              <a:rPr lang="en-US" dirty="0" err="1" smtClean="0"/>
+              <a:t>của</a:t>
+            </a:r>
+            <a:r>
+              <a:rPr lang="en-US" dirty="0" smtClean="0"/>
+              <a:t> </a:t>
+            </a:r>
+            <a:r>
+              <a:rPr lang="en-US" dirty="0" err="1" smtClean="0"/>
+              <a:t>chương</a:t>
+            </a:r>
+            <a:r>
+              <a:rPr lang="en-US" dirty="0" smtClean="0"/>
+              <a:t> </a:t>
+            </a:r>
+            <a:r>
+              <a:rPr lang="en-US" dirty="0" err="1" smtClean="0"/>
+              <a:t>trình</a:t>
+            </a:r>
+            <a:endParaRPr lang="en-US" dirty="0" smtClean="0"/>
           </a:p>
         </p:txBody>
       </p:sp>
@@ -5636,7 +6327,373 @@
     </p:spTree>
     <p:extLst>
       <p:ext uri="{BB962C8B-B14F-4D97-AF65-F5344CB8AC3E}">
-        <p14:creationId xmlns:p14="http://schemas.microsoft.com/office/powerpoint/2010/main" val="1314657678"/>
+        <p14:creationId xmlns:p14="http://schemas.microsoft.com/office/powerpoint/2010/main" val="1008592072"/>
+      </p:ext>
+    </p:extLst>
+  </p:cSld>
+  <p:clrMapOvr>
+    <a:masterClrMapping/>
+  </p:clrMapOvr>
+</p:sld>
+</file>
+
+<file path=ppt/slides/slide17.xml><?xml version="1.0" encoding="utf-8"?>
+<p:sld xmlns:a="http://schemas.openxmlformats.org/drawingml/2006/main" xmlns:r="http://schemas.openxmlformats.org/officeDocument/2006/relationships" xmlns:p="http://schemas.openxmlformats.org/presentationml/2006/main">
+  <p:cSld>
+    <p:spTree>
+      <p:nvGrpSpPr>
+        <p:cNvPr id="1" name=""/>
+        <p:cNvGrpSpPr/>
+        <p:nvPr/>
+      </p:nvGrpSpPr>
+      <p:grpSpPr>
+        <a:xfrm>
+          <a:off x="0" y="0"/>
+          <a:ext cx="0" cy="0"/>
+          <a:chOff x="0" y="0"/>
+          <a:chExt cx="0" cy="0"/>
+        </a:xfrm>
+      </p:grpSpPr>
+      <p:pic>
+        <p:nvPicPr>
+          <p:cNvPr id="5" name="Content Placeholder 4"/>
+          <p:cNvPicPr>
+            <a:picLocks noGrp="1" noChangeAspect="1"/>
+          </p:cNvPicPr>
+          <p:nvPr>
+            <p:ph idx="1"/>
+          </p:nvPr>
+        </p:nvPicPr>
+        <p:blipFill>
+          <a:blip r:embed="rId2">
+            <a:extLst>
+              <a:ext uri="{28A0092B-C50C-407E-A947-70E740481C1C}">
+                <a14:useLocalDpi xmlns:a14="http://schemas.microsoft.com/office/drawing/2010/main" val="0"/>
+              </a:ext>
+            </a:extLst>
+          </a:blip>
+          <a:stretch>
+            <a:fillRect/>
+          </a:stretch>
+        </p:blipFill>
+        <p:spPr>
+          <a:xfrm>
+            <a:off x="539552" y="1340768"/>
+            <a:ext cx="8245938" cy="4248472"/>
+          </a:xfrm>
+        </p:spPr>
+      </p:pic>
+      <p:sp>
+        <p:nvSpPr>
+          <p:cNvPr id="4" name="Slide Number Placeholder 3"/>
+          <p:cNvSpPr>
+            <a:spLocks noGrp="1"/>
+          </p:cNvSpPr>
+          <p:nvPr>
+            <p:ph type="sldNum" sz="quarter" idx="12"/>
+          </p:nvPr>
+        </p:nvSpPr>
+        <p:spPr/>
+        <p:txBody>
+          <a:bodyPr/>
+          <a:lstStyle/>
+          <a:p>
+            <a:fld id="{3283F836-7072-4261-ABB3-ED9F6EF4964D}" type="slidenum">
+              <a:rPr lang="vi-VN" smtClean="0"/>
+              <a:t>17</a:t>
+            </a:fld>
+            <a:endParaRPr lang="vi-VN"/>
+          </a:p>
+        </p:txBody>
+      </p:sp>
+      <p:sp>
+        <p:nvSpPr>
+          <p:cNvPr id="6" name="TextBox 5"/>
+          <p:cNvSpPr txBox="1"/>
+          <p:nvPr/>
+        </p:nvSpPr>
+        <p:spPr>
+          <a:xfrm>
+            <a:off x="2903065" y="5894793"/>
+            <a:ext cx="3518912" cy="369332"/>
+          </a:xfrm>
+          <a:prstGeom prst="rect">
+            <a:avLst/>
+          </a:prstGeom>
+          <a:noFill/>
+        </p:spPr>
+        <p:txBody>
+          <a:bodyPr wrap="none" rtlCol="0">
+            <a:spAutoFit/>
+          </a:bodyPr>
+          <a:lstStyle/>
+          <a:p>
+            <a:r>
+              <a:rPr lang="vi-VN" dirty="0" smtClean="0"/>
+              <a:t>Hình 2.4.1: Giao diện đăng nhập</a:t>
+            </a:r>
+            <a:endParaRPr lang="vi-VN" dirty="0"/>
+          </a:p>
+        </p:txBody>
+      </p:sp>
+    </p:spTree>
+    <p:extLst>
+      <p:ext uri="{BB962C8B-B14F-4D97-AF65-F5344CB8AC3E}">
+        <p14:creationId xmlns:p14="http://schemas.microsoft.com/office/powerpoint/2010/main" val="1584933602"/>
+      </p:ext>
+    </p:extLst>
+  </p:cSld>
+  <p:clrMapOvr>
+    <a:masterClrMapping/>
+  </p:clrMapOvr>
+</p:sld>
+</file>
+
+<file path=ppt/slides/slide18.xml><?xml version="1.0" encoding="utf-8"?>
+<p:sld xmlns:a="http://schemas.openxmlformats.org/drawingml/2006/main" xmlns:r="http://schemas.openxmlformats.org/officeDocument/2006/relationships" xmlns:p="http://schemas.openxmlformats.org/presentationml/2006/main">
+  <p:cSld>
+    <p:spTree>
+      <p:nvGrpSpPr>
+        <p:cNvPr id="1" name=""/>
+        <p:cNvGrpSpPr/>
+        <p:nvPr/>
+      </p:nvGrpSpPr>
+      <p:grpSpPr>
+        <a:xfrm>
+          <a:off x="0" y="0"/>
+          <a:ext cx="0" cy="0"/>
+          <a:chOff x="0" y="0"/>
+          <a:chExt cx="0" cy="0"/>
+        </a:xfrm>
+      </p:grpSpPr>
+      <p:pic>
+        <p:nvPicPr>
+          <p:cNvPr id="5" name="Content Placeholder 4"/>
+          <p:cNvPicPr>
+            <a:picLocks noGrp="1" noChangeAspect="1"/>
+          </p:cNvPicPr>
+          <p:nvPr>
+            <p:ph idx="1"/>
+          </p:nvPr>
+        </p:nvPicPr>
+        <p:blipFill>
+          <a:blip r:embed="rId2">
+            <a:extLst>
+              <a:ext uri="{28A0092B-C50C-407E-A947-70E740481C1C}">
+                <a14:useLocalDpi xmlns:a14="http://schemas.microsoft.com/office/drawing/2010/main" val="0"/>
+              </a:ext>
+            </a:extLst>
+          </a:blip>
+          <a:stretch>
+            <a:fillRect/>
+          </a:stretch>
+        </p:blipFill>
+        <p:spPr>
+          <a:xfrm>
+            <a:off x="683568" y="1268760"/>
+            <a:ext cx="7919009" cy="4373717"/>
+          </a:xfrm>
+        </p:spPr>
+      </p:pic>
+      <p:sp>
+        <p:nvSpPr>
+          <p:cNvPr id="4" name="Slide Number Placeholder 3"/>
+          <p:cNvSpPr>
+            <a:spLocks noGrp="1"/>
+          </p:cNvSpPr>
+          <p:nvPr>
+            <p:ph type="sldNum" sz="quarter" idx="12"/>
+          </p:nvPr>
+        </p:nvSpPr>
+        <p:spPr/>
+        <p:txBody>
+          <a:bodyPr/>
+          <a:lstStyle/>
+          <a:p>
+            <a:fld id="{3283F836-7072-4261-ABB3-ED9F6EF4964D}" type="slidenum">
+              <a:rPr lang="vi-VN" smtClean="0"/>
+              <a:t>18</a:t>
+            </a:fld>
+            <a:endParaRPr lang="vi-VN"/>
+          </a:p>
+        </p:txBody>
+      </p:sp>
+      <p:pic>
+        <p:nvPicPr>
+          <p:cNvPr id="6" name="Picture 5"/>
+          <p:cNvPicPr>
+            <a:picLocks noChangeAspect="1"/>
+          </p:cNvPicPr>
+          <p:nvPr/>
+        </p:nvPicPr>
+        <p:blipFill>
+          <a:blip r:embed="rId2">
+            <a:extLst>
+              <a:ext uri="{28A0092B-C50C-407E-A947-70E740481C1C}">
+                <a14:useLocalDpi xmlns:a14="http://schemas.microsoft.com/office/drawing/2010/main" val="0"/>
+              </a:ext>
+            </a:extLst>
+          </a:blip>
+          <a:stretch>
+            <a:fillRect/>
+          </a:stretch>
+        </p:blipFill>
+        <p:spPr>
+          <a:xfrm>
+            <a:off x="245922" y="1268760"/>
+            <a:ext cx="8474505" cy="4680520"/>
+          </a:xfrm>
+          <a:prstGeom prst="rect">
+            <a:avLst/>
+          </a:prstGeom>
+        </p:spPr>
+      </p:pic>
+      <p:sp>
+        <p:nvSpPr>
+          <p:cNvPr id="7" name="TextBox 6"/>
+          <p:cNvSpPr txBox="1"/>
+          <p:nvPr/>
+        </p:nvSpPr>
+        <p:spPr>
+          <a:xfrm>
+            <a:off x="2883616" y="6179733"/>
+            <a:ext cx="3403496" cy="369332"/>
+          </a:xfrm>
+          <a:prstGeom prst="rect">
+            <a:avLst/>
+          </a:prstGeom>
+          <a:noFill/>
+        </p:spPr>
+        <p:txBody>
+          <a:bodyPr wrap="none" rtlCol="0">
+            <a:spAutoFit/>
+          </a:bodyPr>
+          <a:lstStyle/>
+          <a:p>
+            <a:r>
+              <a:rPr lang="vi-VN" dirty="0" smtClean="0"/>
+              <a:t>Hình 2.4.1: Giao diện cửa hàng</a:t>
+            </a:r>
+            <a:endParaRPr lang="vi-VN" dirty="0"/>
+          </a:p>
+        </p:txBody>
+      </p:sp>
+    </p:spTree>
+    <p:extLst>
+      <p:ext uri="{BB962C8B-B14F-4D97-AF65-F5344CB8AC3E}">
+        <p14:creationId xmlns:p14="http://schemas.microsoft.com/office/powerpoint/2010/main" val="3087078974"/>
+      </p:ext>
+    </p:extLst>
+  </p:cSld>
+  <p:clrMapOvr>
+    <a:masterClrMapping/>
+  </p:clrMapOvr>
+</p:sld>
+</file>
+
+<file path=ppt/slides/slide19.xml><?xml version="1.0" encoding="utf-8"?>
+<p:sld xmlns:a="http://schemas.openxmlformats.org/drawingml/2006/main" xmlns:r="http://schemas.openxmlformats.org/officeDocument/2006/relationships" xmlns:p="http://schemas.openxmlformats.org/presentationml/2006/main">
+  <p:cSld>
+    <p:spTree>
+      <p:nvGrpSpPr>
+        <p:cNvPr id="1" name=""/>
+        <p:cNvGrpSpPr/>
+        <p:nvPr/>
+      </p:nvGrpSpPr>
+      <p:grpSpPr>
+        <a:xfrm>
+          <a:off x="0" y="0"/>
+          <a:ext cx="0" cy="0"/>
+          <a:chOff x="0" y="0"/>
+          <a:chExt cx="0" cy="0"/>
+        </a:xfrm>
+      </p:grpSpPr>
+      <p:sp>
+        <p:nvSpPr>
+          <p:cNvPr id="4" name="Slide Number Placeholder 3"/>
+          <p:cNvSpPr>
+            <a:spLocks noGrp="1"/>
+          </p:cNvSpPr>
+          <p:nvPr>
+            <p:ph type="sldNum" sz="quarter" idx="12"/>
+          </p:nvPr>
+        </p:nvSpPr>
+        <p:spPr/>
+        <p:txBody>
+          <a:bodyPr/>
+          <a:lstStyle/>
+          <a:p>
+            <a:fld id="{3283F836-7072-4261-ABB3-ED9F6EF4964D}" type="slidenum">
+              <a:rPr lang="vi-VN" smtClean="0"/>
+              <a:t>19</a:t>
+            </a:fld>
+            <a:endParaRPr lang="vi-VN"/>
+          </a:p>
+        </p:txBody>
+      </p:sp>
+      <p:pic>
+        <p:nvPicPr>
+          <p:cNvPr id="5" name="Picture 4"/>
+          <p:cNvPicPr>
+            <a:picLocks noChangeAspect="1"/>
+          </p:cNvPicPr>
+          <p:nvPr/>
+        </p:nvPicPr>
+        <p:blipFill>
+          <a:blip r:embed="rId2">
+            <a:extLst>
+              <a:ext uri="{28A0092B-C50C-407E-A947-70E740481C1C}">
+                <a14:useLocalDpi xmlns:a14="http://schemas.microsoft.com/office/drawing/2010/main" val="0"/>
+              </a:ext>
+            </a:extLst>
+          </a:blip>
+          <a:stretch>
+            <a:fillRect/>
+          </a:stretch>
+        </p:blipFill>
+        <p:spPr>
+          <a:xfrm>
+            <a:off x="328020" y="1118865"/>
+            <a:ext cx="8487960" cy="4620270"/>
+          </a:xfrm>
+          <a:prstGeom prst="rect">
+            <a:avLst/>
+          </a:prstGeom>
+        </p:spPr>
+      </p:pic>
+      <p:sp>
+        <p:nvSpPr>
+          <p:cNvPr id="6" name="TextBox 5"/>
+          <p:cNvSpPr txBox="1"/>
+          <p:nvPr/>
+        </p:nvSpPr>
+        <p:spPr>
+          <a:xfrm>
+            <a:off x="3275856" y="6038801"/>
+            <a:ext cx="2236510" cy="369332"/>
+          </a:xfrm>
+          <a:prstGeom prst="rect">
+            <a:avLst/>
+          </a:prstGeom>
+          <a:noFill/>
+        </p:spPr>
+        <p:txBody>
+          <a:bodyPr wrap="none" rtlCol="0">
+            <a:spAutoFit/>
+          </a:bodyPr>
+          <a:lstStyle/>
+          <a:p>
+            <a:r>
+              <a:rPr lang="vi-VN" dirty="0" smtClean="0"/>
+              <a:t>Hình 2.4.3: Nhà kho</a:t>
+            </a:r>
+          </a:p>
+        </p:txBody>
+      </p:sp>
+    </p:spTree>
+    <p:extLst>
+      <p:ext uri="{BB962C8B-B14F-4D97-AF65-F5344CB8AC3E}">
+        <p14:creationId xmlns:p14="http://schemas.microsoft.com/office/powerpoint/2010/main" val="1910726750"/>
       </p:ext>
     </p:extLst>
   </p:cSld>
@@ -5720,34 +6777,12 @@
               <a:buAutoNum type="arabicPeriod"/>
             </a:pPr>
             <a:r>
-              <a:rPr lang="en-US" sz="2400" dirty="0" err="1" smtClean="0"/>
-              <a:t>Giới</a:t>
-            </a:r>
-            <a:r>
-              <a:rPr lang="en-US" sz="2400" dirty="0" smtClean="0"/>
-              <a:t> </a:t>
-            </a:r>
-            <a:r>
-              <a:rPr lang="en-US" sz="2400" dirty="0" err="1" smtClean="0"/>
-              <a:t>thiệu</a:t>
-            </a:r>
-            <a:r>
-              <a:rPr lang="en-US" sz="2400" dirty="0" smtClean="0"/>
-              <a:t> </a:t>
-            </a:r>
-            <a:r>
-              <a:rPr lang="en-US" sz="2400" dirty="0" err="1" smtClean="0"/>
-              <a:t>tổng</a:t>
-            </a:r>
-            <a:r>
-              <a:rPr lang="en-US" sz="2400" dirty="0" smtClean="0"/>
-              <a:t> </a:t>
-            </a:r>
-            <a:r>
-              <a:rPr lang="en-US" sz="2400" dirty="0" err="1" smtClean="0"/>
-              <a:t>quan</a:t>
-            </a:r>
-            <a:endParaRPr lang="en-US" sz="2400" dirty="0"/>
+              <a:rPr lang="vi-VN" sz="2400" dirty="0" smtClean="0">
+                <a:hlinkClick r:id="rId3" action="ppaction://hlinksldjump"/>
+              </a:rPr>
+              <a:t>Giới thiệu tổng quan</a:t>
+            </a:r>
+            <a:endParaRPr lang="vi-VN" sz="2400" dirty="0" smtClean="0"/>
           </a:p>
           <a:p>
             <a:pPr marL="502920" indent="-457200">
@@ -5755,30 +6790,12 @@
               <a:buAutoNum type="arabicPeriod"/>
             </a:pPr>
             <a:r>
-              <a:rPr lang="en-US" sz="2400" dirty="0" smtClean="0"/>
-              <a:t>Chi </a:t>
-            </a:r>
-            <a:r>
-              <a:rPr lang="en-US" sz="2400" dirty="0" err="1" smtClean="0"/>
-              <a:t>tiết</a:t>
-            </a:r>
-            <a:r>
-              <a:rPr lang="en-US" sz="2400" dirty="0" smtClean="0"/>
-              <a:t> </a:t>
-            </a:r>
-            <a:r>
-              <a:rPr lang="en-US" sz="2400" dirty="0" err="1" smtClean="0"/>
-              <a:t>phần</a:t>
-            </a:r>
-            <a:r>
-              <a:rPr lang="en-US" sz="2400" dirty="0" smtClean="0"/>
-              <a:t> </a:t>
-            </a:r>
-            <a:r>
-              <a:rPr lang="en-US" sz="2400" dirty="0" err="1" smtClean="0"/>
-              <a:t>mềm</a:t>
-            </a:r>
-            <a:endParaRPr lang="en-US" sz="2400" dirty="0" smtClean="0"/>
+              <a:rPr lang="vi-VN" sz="2400" dirty="0" smtClean="0">
+                <a:hlinkClick r:id="rId4" action="ppaction://hlinksldjump"/>
+              </a:rPr>
+              <a:t>Chi tiết phần mềm</a:t>
+            </a:r>
+            <a:endParaRPr lang="vi-VN" sz="2400" dirty="0" smtClean="0"/>
           </a:p>
           <a:p>
             <a:pPr>
@@ -5832,6 +6849,284 @@
 </p:sld>
 </file>
 
+<file path=ppt/slides/slide20.xml><?xml version="1.0" encoding="utf-8"?>
+<p:sld xmlns:a="http://schemas.openxmlformats.org/drawingml/2006/main" xmlns:r="http://schemas.openxmlformats.org/officeDocument/2006/relationships" xmlns:p="http://schemas.openxmlformats.org/presentationml/2006/main">
+  <p:cSld>
+    <p:spTree>
+      <p:nvGrpSpPr>
+        <p:cNvPr id="1" name=""/>
+        <p:cNvGrpSpPr/>
+        <p:nvPr/>
+      </p:nvGrpSpPr>
+      <p:grpSpPr>
+        <a:xfrm>
+          <a:off x="0" y="0"/>
+          <a:ext cx="0" cy="0"/>
+          <a:chOff x="0" y="0"/>
+          <a:chExt cx="0" cy="0"/>
+        </a:xfrm>
+      </p:grpSpPr>
+      <p:pic>
+        <p:nvPicPr>
+          <p:cNvPr id="5" name="Content Placeholder 4"/>
+          <p:cNvPicPr>
+            <a:picLocks noGrp="1" noChangeAspect="1"/>
+          </p:cNvPicPr>
+          <p:nvPr>
+            <p:ph idx="1"/>
+          </p:nvPr>
+        </p:nvPicPr>
+        <p:blipFill>
+          <a:blip r:embed="rId2">
+            <a:extLst>
+              <a:ext uri="{28A0092B-C50C-407E-A947-70E740481C1C}">
+                <a14:useLocalDpi xmlns:a14="http://schemas.microsoft.com/office/drawing/2010/main" val="0"/>
+              </a:ext>
+            </a:extLst>
+          </a:blip>
+          <a:stretch>
+            <a:fillRect/>
+          </a:stretch>
+        </p:blipFill>
+        <p:spPr>
+          <a:xfrm>
+            <a:off x="827584" y="1268760"/>
+            <a:ext cx="7776864" cy="4563189"/>
+          </a:xfrm>
+        </p:spPr>
+      </p:pic>
+      <p:sp>
+        <p:nvSpPr>
+          <p:cNvPr id="4" name="Slide Number Placeholder 3"/>
+          <p:cNvSpPr>
+            <a:spLocks noGrp="1"/>
+          </p:cNvSpPr>
+          <p:nvPr>
+            <p:ph type="sldNum" sz="quarter" idx="12"/>
+          </p:nvPr>
+        </p:nvSpPr>
+        <p:spPr/>
+        <p:txBody>
+          <a:bodyPr/>
+          <a:lstStyle/>
+          <a:p>
+            <a:fld id="{3283F836-7072-4261-ABB3-ED9F6EF4964D}" type="slidenum">
+              <a:rPr lang="vi-VN" smtClean="0"/>
+              <a:t>20</a:t>
+            </a:fld>
+            <a:endParaRPr lang="vi-VN"/>
+          </a:p>
+        </p:txBody>
+      </p:sp>
+      <p:sp>
+        <p:nvSpPr>
+          <p:cNvPr id="6" name="TextBox 5"/>
+          <p:cNvSpPr txBox="1"/>
+          <p:nvPr/>
+        </p:nvSpPr>
+        <p:spPr>
+          <a:xfrm>
+            <a:off x="2898852" y="6065494"/>
+            <a:ext cx="3634328" cy="369332"/>
+          </a:xfrm>
+          <a:prstGeom prst="rect">
+            <a:avLst/>
+          </a:prstGeom>
+          <a:noFill/>
+        </p:spPr>
+        <p:txBody>
+          <a:bodyPr wrap="none" rtlCol="0">
+            <a:spAutoFit/>
+          </a:bodyPr>
+          <a:lstStyle/>
+          <a:p>
+            <a:r>
+              <a:rPr lang="vi-VN" dirty="0" smtClean="0"/>
+              <a:t>Hình 2.4.4: Mẫu điền chi tiết hàng</a:t>
+            </a:r>
+            <a:endParaRPr lang="vi-VN" dirty="0"/>
+          </a:p>
+        </p:txBody>
+      </p:sp>
+    </p:spTree>
+    <p:extLst>
+      <p:ext uri="{BB962C8B-B14F-4D97-AF65-F5344CB8AC3E}">
+        <p14:creationId xmlns:p14="http://schemas.microsoft.com/office/powerpoint/2010/main" val="1494355702"/>
+      </p:ext>
+    </p:extLst>
+  </p:cSld>
+  <p:clrMapOvr>
+    <a:masterClrMapping/>
+  </p:clrMapOvr>
+</p:sld>
+</file>
+
+<file path=ppt/slides/slide21.xml><?xml version="1.0" encoding="utf-8"?>
+<p:sld xmlns:a="http://schemas.openxmlformats.org/drawingml/2006/main" xmlns:r="http://schemas.openxmlformats.org/officeDocument/2006/relationships" xmlns:p="http://schemas.openxmlformats.org/presentationml/2006/main">
+  <p:cSld>
+    <p:spTree>
+      <p:nvGrpSpPr>
+        <p:cNvPr id="1" name=""/>
+        <p:cNvGrpSpPr/>
+        <p:nvPr/>
+      </p:nvGrpSpPr>
+      <p:grpSpPr>
+        <a:xfrm>
+          <a:off x="0" y="0"/>
+          <a:ext cx="0" cy="0"/>
+          <a:chOff x="0" y="0"/>
+          <a:chExt cx="0" cy="0"/>
+        </a:xfrm>
+      </p:grpSpPr>
+      <p:sp>
+        <p:nvSpPr>
+          <p:cNvPr id="3" name="Content Placeholder 2"/>
+          <p:cNvSpPr>
+            <a:spLocks noGrp="1"/>
+          </p:cNvSpPr>
+          <p:nvPr>
+            <p:ph idx="1"/>
+          </p:nvPr>
+        </p:nvSpPr>
+        <p:spPr>
+          <a:xfrm>
+            <a:off x="940418" y="2276872"/>
+            <a:ext cx="7315200" cy="3539527"/>
+          </a:xfrm>
+        </p:spPr>
+        <p:txBody>
+          <a:bodyPr>
+            <a:normAutofit/>
+          </a:bodyPr>
+          <a:lstStyle/>
+          <a:p>
+            <a:pPr marL="45720" indent="0" algn="ctr">
+              <a:buNone/>
+            </a:pPr>
+            <a:r>
+              <a:rPr lang="vi-VN" sz="3200" dirty="0" smtClean="0">
+                <a:solidFill>
+                  <a:srgbClr val="FFC000"/>
+                </a:solidFill>
+              </a:rPr>
+              <a:t>Phần trình bày đã kết thúc</a:t>
+            </a:r>
+            <a:br>
+              <a:rPr lang="vi-VN" sz="3200" dirty="0" smtClean="0">
+                <a:solidFill>
+                  <a:srgbClr val="FFC000"/>
+                </a:solidFill>
+              </a:rPr>
+            </a:br>
+            <a:r>
+              <a:rPr lang="vi-VN" sz="3200" dirty="0" smtClean="0">
+                <a:solidFill>
+                  <a:srgbClr val="FFC000"/>
+                </a:solidFill>
+              </a:rPr>
+              <a:t/>
+            </a:r>
+            <a:br>
+              <a:rPr lang="vi-VN" sz="3200" dirty="0" smtClean="0">
+                <a:solidFill>
+                  <a:srgbClr val="FFC000"/>
+                </a:solidFill>
+              </a:rPr>
+            </a:br>
+            <a:r>
+              <a:rPr lang="vi-VN" sz="3200" dirty="0" smtClean="0">
+                <a:solidFill>
+                  <a:srgbClr val="FFC000"/>
+                </a:solidFill>
+              </a:rPr>
+              <a:t>Cảm ơn mọi người đã lắng nghe</a:t>
+            </a:r>
+            <a:endParaRPr lang="vi-VN" sz="3200" dirty="0">
+              <a:solidFill>
+                <a:srgbClr val="FFC000"/>
+              </a:solidFill>
+            </a:endParaRPr>
+          </a:p>
+        </p:txBody>
+      </p:sp>
+      <p:sp>
+        <p:nvSpPr>
+          <p:cNvPr id="4" name="Slide Number Placeholder 3"/>
+          <p:cNvSpPr>
+            <a:spLocks noGrp="1"/>
+          </p:cNvSpPr>
+          <p:nvPr>
+            <p:ph type="sldNum" sz="quarter" idx="12"/>
+          </p:nvPr>
+        </p:nvSpPr>
+        <p:spPr/>
+        <p:txBody>
+          <a:bodyPr/>
+          <a:lstStyle/>
+          <a:p>
+            <a:fld id="{3283F836-7072-4261-ABB3-ED9F6EF4964D}" type="slidenum">
+              <a:rPr lang="vi-VN" smtClean="0"/>
+              <a:t>21</a:t>
+            </a:fld>
+            <a:endParaRPr lang="vi-VN"/>
+          </a:p>
+        </p:txBody>
+      </p:sp>
+      <p:sp>
+        <p:nvSpPr>
+          <p:cNvPr id="6" name="Rectangle 5">
+            <a:hlinkClick r:id="" action="ppaction://hlinkshowjump?jump=firstslide"/>
+          </p:cNvPr>
+          <p:cNvSpPr/>
+          <p:nvPr/>
+        </p:nvSpPr>
+        <p:spPr>
+          <a:xfrm>
+            <a:off x="7785016" y="6021288"/>
+            <a:ext cx="891440" cy="648072"/>
+          </a:xfrm>
+          <a:prstGeom prst="rect">
+            <a:avLst/>
+          </a:prstGeom>
+        </p:spPr>
+        <p:style>
+          <a:lnRef idx="2">
+            <a:schemeClr val="accent1">
+              <a:shade val="50000"/>
+            </a:schemeClr>
+          </a:lnRef>
+          <a:fillRef idx="1">
+            <a:schemeClr val="accent1"/>
+          </a:fillRef>
+          <a:effectRef idx="0">
+            <a:schemeClr val="accent1"/>
+          </a:effectRef>
+          <a:fontRef idx="minor">
+            <a:schemeClr val="lt1"/>
+          </a:fontRef>
+        </p:style>
+        <p:txBody>
+          <a:bodyPr rtlCol="0" anchor="ctr"/>
+          <a:lstStyle/>
+          <a:p>
+            <a:pPr algn="ctr"/>
+            <a:endParaRPr lang="vi-VN"/>
+          </a:p>
+        </p:txBody>
+      </p:sp>
+    </p:spTree>
+    <p:extLst>
+      <p:ext uri="{BB962C8B-B14F-4D97-AF65-F5344CB8AC3E}">
+        <p14:creationId xmlns:p14="http://schemas.microsoft.com/office/powerpoint/2010/main" val="133325254"/>
+      </p:ext>
+    </p:extLst>
+  </p:cSld>
+  <p:clrMapOvr>
+    <a:masterClrMapping/>
+  </p:clrMapOvr>
+</p:sld>
+</file>
+
 <file path=ppt/slides/slide3.xml><?xml version="1.0" encoding="utf-8"?>
 <p:sld xmlns:a="http://schemas.openxmlformats.org/drawingml/2006/main" xmlns:r="http://schemas.openxmlformats.org/officeDocument/2006/relationships" xmlns:p="http://schemas.openxmlformats.org/presentationml/2006/main">
   <p:cSld>
@@ -5914,21 +7209,30 @@
           <a:lstStyle/>
           <a:p>
             <a:r>
-              <a:rPr lang="vi-VN" sz="2400" dirty="0" smtClean="0"/>
+              <a:rPr lang="vi-VN" sz="2400" dirty="0" smtClean="0">
+                <a:hlinkClick r:id="rId3" action="ppaction://hlinksldjump"/>
+              </a:rPr>
               <a:t>Nhu cầu quản lý cửa hàng và nhà kho</a:t>
             </a:r>
-          </a:p>
-          <a:p>
-            <a:r>
-              <a:rPr lang="vi-VN" sz="2400" dirty="0" smtClean="0"/>
+            <a:endParaRPr lang="vi-VN" sz="2400" dirty="0" smtClean="0"/>
+          </a:p>
+          <a:p>
+            <a:r>
+              <a:rPr lang="vi-VN" sz="2400" dirty="0" smtClean="0">
+                <a:hlinkClick r:id="rId4" action="ppaction://hlinksldjump"/>
+              </a:rPr>
               <a:t>Đối tượng khách hàng mà nhóm muốn hướng đến</a:t>
             </a:r>
-          </a:p>
-          <a:p>
-            <a:r>
-              <a:rPr lang="vi-VN" sz="2400" dirty="0" smtClean="0"/>
+            <a:endParaRPr lang="vi-VN" sz="2400" dirty="0" smtClean="0"/>
+          </a:p>
+          <a:p>
+            <a:r>
+              <a:rPr lang="vi-VN" sz="2400" dirty="0" smtClean="0">
+                <a:hlinkClick r:id="rId5" action="ppaction://hlinksldjump"/>
+              </a:rPr>
               <a:t>Lý do làm phần mềm này</a:t>
             </a:r>
+            <a:endParaRPr lang="vi-VN" sz="2400" dirty="0" smtClean="0"/>
           </a:p>
           <a:p>
             <a:pPr lvl="1">
@@ -6835,64 +8139,39 @@
           <a:lstStyle/>
           <a:p>
             <a:r>
-              <a:rPr lang="en-US" dirty="0" err="1" smtClean="0"/>
-              <a:t>Chức</a:t>
-            </a:r>
-            <a:r>
-              <a:rPr lang="en-US" dirty="0" smtClean="0"/>
-              <a:t> </a:t>
-            </a:r>
-            <a:r>
-              <a:rPr lang="en-US" dirty="0" err="1" smtClean="0"/>
-              <a:t>năng</a:t>
-            </a:r>
-            <a:endParaRPr lang="en-US" dirty="0" smtClean="0"/>
-          </a:p>
-          <a:p>
-            <a:r>
-              <a:rPr lang="en-US" dirty="0" err="1" smtClean="0"/>
-              <a:t>Cơ</a:t>
-            </a:r>
-            <a:r>
-              <a:rPr lang="en-US" dirty="0" smtClean="0"/>
-              <a:t> </a:t>
-            </a:r>
-            <a:r>
-              <a:rPr lang="en-US" dirty="0" err="1" smtClean="0"/>
-              <a:t>sở</a:t>
-            </a:r>
-            <a:r>
-              <a:rPr lang="en-US" dirty="0" smtClean="0"/>
-              <a:t> </a:t>
-            </a:r>
-            <a:r>
-              <a:rPr lang="en-US" dirty="0" err="1" smtClean="0"/>
-              <a:t>giữ</a:t>
-            </a:r>
-            <a:r>
-              <a:rPr lang="en-US" dirty="0" smtClean="0"/>
-              <a:t> </a:t>
-            </a:r>
-            <a:r>
-              <a:rPr lang="en-US" dirty="0" err="1" smtClean="0"/>
-              <a:t>liệu</a:t>
-            </a:r>
-            <a:endParaRPr lang="en-US" dirty="0" smtClean="0"/>
-          </a:p>
-          <a:p>
-            <a:r>
-              <a:rPr lang="en-US" dirty="0" err="1"/>
-              <a:t>Giao</a:t>
-            </a:r>
-            <a:r>
-              <a:rPr lang="en-US" dirty="0"/>
-              <a:t> </a:t>
-            </a:r>
-            <a:r>
-              <a:rPr lang="en-US" dirty="0" err="1"/>
-              <a:t>diện</a:t>
-            </a:r>
-            <a:endParaRPr lang="en-US" dirty="0"/>
+              <a:rPr lang="vi-VN" dirty="0" smtClean="0">
+                <a:hlinkClick r:id="rId2" action="ppaction://hlinksldjump"/>
+              </a:rPr>
+              <a:t>Mục tiêu</a:t>
+            </a:r>
+            <a:endParaRPr lang="vi-VN" dirty="0" smtClean="0"/>
+          </a:p>
+          <a:p>
+            <a:r>
+              <a:rPr lang="vi-VN" dirty="0" smtClean="0">
+                <a:hlinkClick r:id="rId3" action="ppaction://hlinksldjump"/>
+              </a:rPr>
+              <a:t>Chức năng</a:t>
+            </a:r>
+            <a:endParaRPr lang="vi-VN" dirty="0" smtClean="0"/>
+          </a:p>
+          <a:p>
+            <a:r>
+              <a:rPr lang="vi-VN" dirty="0" smtClean="0">
+                <a:hlinkClick r:id="rId4" action="ppaction://hlinksldjump"/>
+              </a:rPr>
+              <a:t>Cơ sở giữ liệu</a:t>
+            </a:r>
+            <a:endParaRPr lang="vi-VN" dirty="0" smtClean="0"/>
+          </a:p>
+          <a:p>
+            <a:r>
+              <a:rPr lang="vi-VN" dirty="0" smtClean="0">
+                <a:hlinkClick r:id="rId5" action="ppaction://hlinksldjump"/>
+              </a:rPr>
+              <a:t>Giao diện</a:t>
+            </a:r>
+            <a:endParaRPr lang="vi-VN" dirty="0" smtClean="0"/>
           </a:p>
           <a:p>
             <a:endParaRPr lang="en-US" dirty="0" smtClean="0"/>
@@ -6968,28 +8247,39 @@
             <p:ph type="title"/>
           </p:nvPr>
         </p:nvSpPr>
-        <p:spPr/>
-        <p:txBody>
-          <a:bodyPr>
-            <a:normAutofit/>
-          </a:bodyPr>
-          <a:lstStyle/>
-          <a:p>
-            <a:r>
-              <a:rPr lang="en-US" dirty="0" smtClean="0"/>
-              <a:t>2.1  </a:t>
-            </a:r>
-            <a:r>
-              <a:rPr lang="en-US" dirty="0" err="1" smtClean="0"/>
-              <a:t>Chức</a:t>
-            </a:r>
-            <a:r>
-              <a:rPr lang="en-US" dirty="0" smtClean="0"/>
-              <a:t> </a:t>
-            </a:r>
-            <a:r>
-              <a:rPr lang="en-US" dirty="0" err="1" smtClean="0"/>
-              <a:t>năng</a:t>
+        <p:spPr>
+          <a:xfrm>
+            <a:off x="914400" y="980728"/>
+            <a:ext cx="7315200" cy="1154097"/>
+          </a:xfrm>
+        </p:spPr>
+        <p:txBody>
+          <a:bodyPr/>
+          <a:lstStyle/>
+          <a:p>
+            <a:r>
+              <a:rPr lang="en-US" dirty="0" smtClean="0"/>
+              <a:t>2.1 </a:t>
+            </a:r>
+            <a:r>
+              <a:rPr lang="en-US" dirty="0" err="1" smtClean="0"/>
+              <a:t>Mục</a:t>
+            </a:r>
+            <a:r>
+              <a:rPr lang="en-US" dirty="0" smtClean="0"/>
+              <a:t> </a:t>
+            </a:r>
+            <a:r>
+              <a:rPr lang="en-US" dirty="0" err="1" smtClean="0"/>
+              <a:t>tiêu</a:t>
+            </a:r>
+            <a:r>
+              <a:rPr lang="en-US" dirty="0" smtClean="0"/>
+              <a:t>-ý </a:t>
+            </a:r>
+            <a:r>
+              <a:rPr lang="en-US" dirty="0" err="1" smtClean="0"/>
+              <a:t>tưởng</a:t>
             </a:r>
             <a:endParaRPr lang="vi-VN" dirty="0"/>
           </a:p>
@@ -7005,331 +8295,86 @@
             <p:ph idx="1"/>
           </p:nvPr>
         </p:nvSpPr>
-        <p:spPr/>
-        <p:txBody>
-          <a:bodyPr/>
-          <a:lstStyle/>
-          <a:p>
-            <a:r>
-              <a:rPr lang="en-US" dirty="0" err="1" smtClean="0"/>
-              <a:t>Chương</a:t>
-            </a:r>
-            <a:r>
-              <a:rPr lang="en-US" dirty="0" smtClean="0"/>
-              <a:t> </a:t>
-            </a:r>
-            <a:r>
-              <a:rPr lang="en-US" dirty="0" err="1" smtClean="0"/>
-              <a:t>trình</a:t>
-            </a:r>
-            <a:r>
-              <a:rPr lang="en-US" dirty="0" smtClean="0"/>
-              <a:t> </a:t>
-            </a:r>
-            <a:r>
-              <a:rPr lang="en-US" dirty="0" err="1" smtClean="0"/>
-              <a:t>có</a:t>
-            </a:r>
-            <a:r>
-              <a:rPr lang="en-US" dirty="0" smtClean="0"/>
-              <a:t> </a:t>
-            </a:r>
-            <a:r>
-              <a:rPr lang="en-US" dirty="0" err="1" smtClean="0"/>
-              <a:t>các</a:t>
-            </a:r>
-            <a:r>
-              <a:rPr lang="en-US" dirty="0" smtClean="0"/>
-              <a:t> </a:t>
-            </a:r>
-            <a:r>
-              <a:rPr lang="en-US" dirty="0" err="1" smtClean="0"/>
-              <a:t>chức</a:t>
-            </a:r>
-            <a:r>
-              <a:rPr lang="en-US" dirty="0" smtClean="0"/>
-              <a:t> </a:t>
-            </a:r>
-            <a:r>
-              <a:rPr lang="en-US" dirty="0" err="1" smtClean="0"/>
-              <a:t>năng</a:t>
-            </a:r>
-            <a:r>
-              <a:rPr lang="en-US" dirty="0" smtClean="0"/>
-              <a:t> </a:t>
-            </a:r>
-            <a:r>
-              <a:rPr lang="en-US" dirty="0" err="1" smtClean="0"/>
-              <a:t>cơ</a:t>
-            </a:r>
-            <a:r>
-              <a:rPr lang="en-US" dirty="0" smtClean="0"/>
-              <a:t> </a:t>
-            </a:r>
-            <a:r>
-              <a:rPr lang="en-US" dirty="0" err="1" smtClean="0"/>
-              <a:t>bản</a:t>
-            </a:r>
-            <a:r>
-              <a:rPr lang="en-US" dirty="0"/>
-              <a:t> </a:t>
-            </a:r>
-            <a:r>
-              <a:rPr lang="en-US" dirty="0" err="1" smtClean="0"/>
-              <a:t>của</a:t>
-            </a:r>
-            <a:r>
-              <a:rPr lang="en-US" dirty="0" smtClean="0"/>
-              <a:t> </a:t>
-            </a:r>
-            <a:r>
-              <a:rPr lang="en-US" dirty="0" err="1" smtClean="0"/>
-              <a:t>một</a:t>
-            </a:r>
-            <a:r>
-              <a:rPr lang="en-US" dirty="0" smtClean="0"/>
-              <a:t> </a:t>
-            </a:r>
-            <a:r>
-              <a:rPr lang="en-US" dirty="0" err="1" smtClean="0"/>
-              <a:t>cửa</a:t>
-            </a:r>
-            <a:r>
-              <a:rPr lang="en-US" dirty="0" smtClean="0"/>
-              <a:t> </a:t>
-            </a:r>
-            <a:r>
-              <a:rPr lang="en-US" dirty="0" err="1" smtClean="0"/>
-              <a:t>hàng</a:t>
-            </a:r>
-            <a:r>
-              <a:rPr lang="en-US" dirty="0" smtClean="0"/>
-              <a:t>/</a:t>
-            </a:r>
-            <a:r>
-              <a:rPr lang="en-US" dirty="0" err="1" smtClean="0"/>
-              <a:t>quán</a:t>
-            </a:r>
-            <a:r>
-              <a:rPr lang="en-US" dirty="0" smtClean="0"/>
-              <a:t> </a:t>
-            </a:r>
-            <a:r>
-              <a:rPr lang="en-US" dirty="0" err="1" smtClean="0"/>
-              <a:t>ăn</a:t>
-            </a:r>
-            <a:r>
-              <a:rPr lang="en-US" dirty="0" smtClean="0"/>
-              <a:t> </a:t>
-            </a:r>
-            <a:r>
-              <a:rPr lang="en-US" dirty="0" err="1" smtClean="0"/>
-              <a:t>bất</a:t>
-            </a:r>
-            <a:r>
-              <a:rPr lang="en-US" dirty="0" smtClean="0"/>
-              <a:t> </a:t>
-            </a:r>
-            <a:r>
-              <a:rPr lang="en-US" dirty="0" err="1" smtClean="0"/>
-              <a:t>kì</a:t>
-            </a:r>
-            <a:r>
-              <a:rPr lang="en-US" dirty="0" smtClean="0"/>
-              <a:t> </a:t>
-            </a:r>
-            <a:r>
-              <a:rPr lang="en-US" dirty="0" err="1" smtClean="0"/>
-              <a:t>nào</a:t>
-            </a:r>
-            <a:r>
-              <a:rPr lang="en-US" dirty="0"/>
-              <a:t>.</a:t>
-            </a:r>
-            <a:endParaRPr lang="en-US" dirty="0" smtClean="0"/>
+        <p:spPr>
+          <a:xfrm>
+            <a:off x="914400" y="2265004"/>
+            <a:ext cx="7315200" cy="3539527"/>
+          </a:xfrm>
+        </p:spPr>
+        <p:txBody>
+          <a:bodyPr/>
+          <a:lstStyle/>
+          <a:p>
+            <a:r>
+              <a:rPr lang="vi-VN" dirty="0" smtClean="0"/>
+              <a:t>Mục tiêu:</a:t>
+            </a:r>
           </a:p>
           <a:p>
             <a:pPr lvl="1">
-              <a:buFont typeface="Arial" pitchFamily="34" charset="0"/>
+              <a:buFont typeface="Arial" panose="020B0604020202020204" pitchFamily="34" charset="0"/>
               <a:buChar char="•"/>
             </a:pPr>
             <a:r>
-              <a:rPr lang="en-US" dirty="0" err="1"/>
-              <a:t>Thêm</a:t>
-            </a:r>
-            <a:r>
-              <a:rPr lang="en-US" dirty="0"/>
-              <a:t> </a:t>
-            </a:r>
-            <a:r>
-              <a:rPr lang="en-US" dirty="0" err="1"/>
-              <a:t>mặt</a:t>
-            </a:r>
-            <a:r>
-              <a:rPr lang="en-US" dirty="0"/>
-              <a:t> </a:t>
-            </a:r>
-            <a:r>
-              <a:rPr lang="en-US" dirty="0" err="1"/>
-              <a:t>hàng</a:t>
-            </a:r>
-            <a:endParaRPr lang="en-US" dirty="0"/>
+              <a:rPr lang="vi-VN" dirty="0" smtClean="0"/>
+              <a:t>Sử dụng những kiến thức đã học, tạo ra một phần mềm quản lý hàng hóa dễ dàng sử dụng cho mọi người</a:t>
+            </a:r>
           </a:p>
           <a:p>
             <a:pPr lvl="1">
-              <a:buFont typeface="Arial" pitchFamily="34" charset="0"/>
+              <a:buFont typeface="Arial" panose="020B0604020202020204" pitchFamily="34" charset="0"/>
               <a:buChar char="•"/>
             </a:pPr>
             <a:r>
-              <a:rPr lang="en-US" dirty="0" err="1"/>
-              <a:t>Xóa</a:t>
-            </a:r>
-            <a:r>
-              <a:rPr lang="en-US" dirty="0"/>
-              <a:t> </a:t>
-            </a:r>
-            <a:r>
-              <a:rPr lang="en-US" dirty="0" err="1"/>
-              <a:t>mặt</a:t>
-            </a:r>
-            <a:r>
-              <a:rPr lang="en-US" dirty="0"/>
-              <a:t> </a:t>
-            </a:r>
-            <a:r>
-              <a:rPr lang="en-US" dirty="0" err="1"/>
-              <a:t>hàng</a:t>
-            </a:r>
-            <a:endParaRPr lang="en-US" dirty="0"/>
+              <a:rPr lang="vi-VN" dirty="0" smtClean="0"/>
+              <a:t>Thực hành thiết kế phần mền</a:t>
+            </a:r>
           </a:p>
           <a:p>
             <a:pPr lvl="1">
-              <a:buFont typeface="Arial" pitchFamily="34" charset="0"/>
+              <a:buFont typeface="Arial" panose="020B0604020202020204" pitchFamily="34" charset="0"/>
               <a:buChar char="•"/>
             </a:pPr>
             <a:r>
-              <a:rPr lang="en-US" dirty="0" err="1"/>
-              <a:t>Nhập</a:t>
-            </a:r>
-            <a:r>
-              <a:rPr lang="en-US" dirty="0"/>
-              <a:t> </a:t>
-            </a:r>
-            <a:r>
-              <a:rPr lang="en-US" dirty="0" err="1"/>
-              <a:t>kho</a:t>
-            </a:r>
-            <a:endParaRPr lang="en-US" dirty="0"/>
+              <a:rPr lang="vi-VN" dirty="0" smtClean="0"/>
+              <a:t>Tăng khả năng làm việc nhóm</a:t>
+            </a:r>
+          </a:p>
+          <a:p>
+            <a:pPr>
+              <a:buFont typeface="Wingdings" panose="05000000000000000000" pitchFamily="2" charset="2"/>
+              <a:buChar char="§"/>
+            </a:pPr>
+            <a:r>
+              <a:rPr lang="vi-VN" dirty="0" smtClean="0"/>
+              <a:t>Ý tưởng:</a:t>
+            </a:r>
           </a:p>
           <a:p>
             <a:pPr lvl="1">
-              <a:buFont typeface="Arial" pitchFamily="34" charset="0"/>
+              <a:buFont typeface="Arial" panose="020B0604020202020204" pitchFamily="34" charset="0"/>
               <a:buChar char="•"/>
             </a:pPr>
             <a:r>
-              <a:rPr lang="en-US" dirty="0" err="1"/>
-              <a:t>Xuất</a:t>
-            </a:r>
-            <a:r>
-              <a:rPr lang="en-US" dirty="0"/>
-              <a:t> </a:t>
-            </a:r>
-            <a:r>
-              <a:rPr lang="en-US" dirty="0" err="1"/>
-              <a:t>kho</a:t>
-            </a:r>
-            <a:endParaRPr lang="en-US" dirty="0"/>
+              <a:rPr lang="vi-VN" dirty="0" smtClean="0"/>
+              <a:t>Phần mềm cần kiểm soát được thông tin mặt hàng (kho hàng) và cho phép bán-lưu thông tin bán của mặt hàng (cửa hàng)</a:t>
+            </a:r>
           </a:p>
           <a:p>
             <a:pPr lvl="1">
-              <a:buFont typeface="Arial" pitchFamily="34" charset="0"/>
+              <a:buFont typeface="Arial" panose="020B0604020202020204" pitchFamily="34" charset="0"/>
               <a:buChar char="•"/>
             </a:pPr>
             <a:r>
-              <a:rPr lang="en-US" dirty="0" err="1"/>
-              <a:t>Thanh</a:t>
-            </a:r>
-            <a:r>
-              <a:rPr lang="en-US" dirty="0"/>
-              <a:t> </a:t>
-            </a:r>
-            <a:r>
-              <a:rPr lang="en-US" dirty="0" err="1"/>
-              <a:t>toán</a:t>
-            </a:r>
-            <a:endParaRPr lang="en-US" dirty="0"/>
+              <a:rPr lang="vi-VN" dirty="0" smtClean="0"/>
+              <a:t>Cho phép người dùng sử dụng tên đăng nhập để tương tác với vai trò của mình (Q.Lý cửa hàng-nhà kho)</a:t>
+            </a:r>
           </a:p>
           <a:p>
             <a:pPr lvl="1">
-              <a:buFont typeface="Arial" pitchFamily="34" charset="0"/>
+              <a:buFont typeface="Arial" panose="020B0604020202020204" pitchFamily="34" charset="0"/>
               <a:buChar char="•"/>
             </a:pPr>
-            <a:r>
-              <a:rPr lang="en-US" dirty="0" err="1"/>
-              <a:t>Thống</a:t>
-            </a:r>
-            <a:r>
-              <a:rPr lang="en-US" dirty="0"/>
-              <a:t> </a:t>
-            </a:r>
-            <a:r>
-              <a:rPr lang="en-US" dirty="0" err="1"/>
-              <a:t>kê</a:t>
-            </a:r>
-            <a:r>
-              <a:rPr lang="en-US" dirty="0"/>
-              <a:t> </a:t>
-            </a:r>
-            <a:r>
-              <a:rPr lang="en-US" dirty="0" err="1"/>
-              <a:t>doanh</a:t>
-            </a:r>
-            <a:r>
-              <a:rPr lang="en-US" dirty="0"/>
-              <a:t> </a:t>
-            </a:r>
-            <a:r>
-              <a:rPr lang="en-US" dirty="0" err="1"/>
-              <a:t>thu</a:t>
-            </a:r>
-            <a:endParaRPr lang="en-US" dirty="0"/>
-          </a:p>
-          <a:p>
-            <a:pPr lvl="1">
-              <a:buFont typeface="Arial" pitchFamily="34" charset="0"/>
-              <a:buChar char="•"/>
-            </a:pPr>
-            <a:r>
-              <a:rPr lang="en-US" dirty="0" err="1" smtClean="0"/>
-              <a:t>Thay</a:t>
-            </a:r>
-            <a:r>
-              <a:rPr lang="en-US" dirty="0" smtClean="0"/>
-              <a:t> </a:t>
-            </a:r>
-            <a:r>
-              <a:rPr lang="en-US" dirty="0" err="1" smtClean="0"/>
-              <a:t>đổi</a:t>
-            </a:r>
-            <a:r>
-              <a:rPr lang="en-US" dirty="0" smtClean="0"/>
-              <a:t> </a:t>
-            </a:r>
-            <a:r>
-              <a:rPr lang="en-US" dirty="0" err="1" smtClean="0"/>
-              <a:t>thông</a:t>
-            </a:r>
-            <a:r>
-              <a:rPr lang="en-US" dirty="0" smtClean="0"/>
-              <a:t> tin </a:t>
-            </a:r>
-            <a:r>
-              <a:rPr lang="en-US" dirty="0" err="1" smtClean="0"/>
-              <a:t>hàng</a:t>
-            </a:r>
-            <a:endParaRPr lang="en-US" dirty="0" smtClean="0"/>
-          </a:p>
-          <a:p>
             <a:endParaRPr lang="vi-VN" dirty="0"/>
           </a:p>
         </p:txBody>
@@ -7360,7 +8405,7 @@
     </p:spTree>
     <p:extLst>
       <p:ext uri="{BB962C8B-B14F-4D97-AF65-F5344CB8AC3E}">
-        <p14:creationId xmlns:p14="http://schemas.microsoft.com/office/powerpoint/2010/main" val="17090828"/>
+        <p14:creationId xmlns:p14="http://schemas.microsoft.com/office/powerpoint/2010/main" val="3155799302"/>
       </p:ext>
     </p:extLst>
   </p:cSld>
@@ -7389,310 +8434,6 @@
       </p:grpSpPr>
       <p:sp>
         <p:nvSpPr>
-          <p:cNvPr id="2" name="Title 1"/>
-          <p:cNvSpPr>
-            <a:spLocks noGrp="1"/>
-          </p:cNvSpPr>
-          <p:nvPr>
-            <p:ph type="title"/>
-          </p:nvPr>
-        </p:nvSpPr>
-        <p:spPr/>
-        <p:txBody>
-          <a:bodyPr/>
-          <a:lstStyle/>
-          <a:p>
-            <a:r>
-              <a:rPr lang="en-US" dirty="0" err="1" smtClean="0"/>
-              <a:t>Thêm</a:t>
-            </a:r>
-            <a:r>
-              <a:rPr lang="en-US" dirty="0" smtClean="0"/>
-              <a:t> </a:t>
-            </a:r>
-            <a:r>
-              <a:rPr lang="en-US" dirty="0" err="1" smtClean="0"/>
-              <a:t>mặt</a:t>
-            </a:r>
-            <a:r>
-              <a:rPr lang="en-US" dirty="0" smtClean="0"/>
-              <a:t> </a:t>
-            </a:r>
-            <a:r>
-              <a:rPr lang="en-US" dirty="0" err="1" smtClean="0"/>
-              <a:t>hàng</a:t>
-            </a:r>
-            <a:endParaRPr lang="vi-VN" dirty="0"/>
-          </a:p>
-        </p:txBody>
-      </p:sp>
-      <p:sp>
-        <p:nvSpPr>
-          <p:cNvPr id="3" name="Content Placeholder 2"/>
-          <p:cNvSpPr>
-            <a:spLocks noGrp="1"/>
-          </p:cNvSpPr>
-          <p:nvPr>
-            <p:ph idx="1"/>
-          </p:nvPr>
-        </p:nvSpPr>
-        <p:spPr/>
-        <p:txBody>
-          <a:bodyPr/>
-          <a:lstStyle/>
-          <a:p>
-            <a:r>
-              <a:rPr lang="en-US" dirty="0" smtClean="0"/>
-              <a:t>Cho </a:t>
-            </a:r>
-            <a:r>
-              <a:rPr lang="en-US" dirty="0" err="1" smtClean="0"/>
-              <a:t>phép</a:t>
-            </a:r>
-            <a:r>
-              <a:rPr lang="en-US" dirty="0" smtClean="0"/>
-              <a:t> </a:t>
-            </a:r>
-            <a:r>
-              <a:rPr lang="en-US" dirty="0" err="1" smtClean="0"/>
-              <a:t>thêm</a:t>
-            </a:r>
-            <a:r>
-              <a:rPr lang="en-US" dirty="0" smtClean="0"/>
-              <a:t> 1 </a:t>
-            </a:r>
-            <a:r>
-              <a:rPr lang="en-US" dirty="0" err="1" smtClean="0"/>
-              <a:t>mặt</a:t>
-            </a:r>
-            <a:r>
-              <a:rPr lang="en-US" dirty="0" smtClean="0"/>
-              <a:t> </a:t>
-            </a:r>
-            <a:r>
-              <a:rPr lang="en-US" dirty="0" err="1" smtClean="0"/>
-              <a:t>hàng</a:t>
-            </a:r>
-            <a:r>
-              <a:rPr lang="en-US" dirty="0" smtClean="0"/>
-              <a:t> </a:t>
-            </a:r>
-            <a:r>
-              <a:rPr lang="en-US" dirty="0" err="1" smtClean="0"/>
-              <a:t>vào</a:t>
-            </a:r>
-            <a:r>
-              <a:rPr lang="en-US" dirty="0" smtClean="0"/>
-              <a:t> </a:t>
-            </a:r>
-            <a:r>
-              <a:rPr lang="en-US" dirty="0" err="1" smtClean="0"/>
-              <a:t>cơ</a:t>
-            </a:r>
-            <a:r>
-              <a:rPr lang="en-US" dirty="0" smtClean="0"/>
-              <a:t> </a:t>
-            </a:r>
-            <a:r>
-              <a:rPr lang="en-US" dirty="0" err="1" smtClean="0"/>
-              <a:t>sở</a:t>
-            </a:r>
-            <a:r>
-              <a:rPr lang="en-US" dirty="0" smtClean="0"/>
-              <a:t> </a:t>
-            </a:r>
-            <a:r>
-              <a:rPr lang="en-US" dirty="0" err="1" smtClean="0"/>
-              <a:t>dữ</a:t>
-            </a:r>
-            <a:r>
-              <a:rPr lang="en-US" dirty="0" smtClean="0"/>
-              <a:t> </a:t>
-            </a:r>
-            <a:r>
-              <a:rPr lang="en-US" dirty="0" err="1" smtClean="0"/>
-              <a:t>liệu</a:t>
-            </a:r>
-            <a:r>
-              <a:rPr lang="en-US" dirty="0" smtClean="0"/>
-              <a:t> </a:t>
-            </a:r>
-            <a:r>
-              <a:rPr lang="en-US" dirty="0" err="1" smtClean="0"/>
-              <a:t>với</a:t>
-            </a:r>
-            <a:r>
-              <a:rPr lang="en-US" dirty="0" smtClean="0"/>
-              <a:t> </a:t>
-            </a:r>
-            <a:r>
-              <a:rPr lang="en-US" dirty="0" err="1" smtClean="0"/>
-              <a:t>các</a:t>
-            </a:r>
-            <a:r>
-              <a:rPr lang="en-US" dirty="0" smtClean="0"/>
-              <a:t> </a:t>
-            </a:r>
-            <a:r>
-              <a:rPr lang="en-US" dirty="0" err="1" smtClean="0"/>
-              <a:t>thông</a:t>
-            </a:r>
-            <a:r>
-              <a:rPr lang="en-US" dirty="0" smtClean="0"/>
-              <a:t> tin:</a:t>
-            </a:r>
-          </a:p>
-          <a:p>
-            <a:pPr lvl="1"/>
-            <a:r>
-              <a:rPr lang="en-US" dirty="0" err="1" smtClean="0"/>
-              <a:t>Tên</a:t>
-            </a:r>
-            <a:r>
-              <a:rPr lang="en-US" dirty="0" smtClean="0"/>
-              <a:t> </a:t>
-            </a:r>
-            <a:r>
-              <a:rPr lang="en-US" dirty="0" err="1" smtClean="0"/>
-              <a:t>mặt</a:t>
-            </a:r>
-            <a:r>
-              <a:rPr lang="en-US" dirty="0" smtClean="0"/>
-              <a:t> </a:t>
-            </a:r>
-            <a:r>
-              <a:rPr lang="en-US" dirty="0" err="1" smtClean="0"/>
-              <a:t>hàng</a:t>
-            </a:r>
-            <a:endParaRPr lang="en-US" dirty="0" smtClean="0"/>
-          </a:p>
-          <a:p>
-            <a:pPr lvl="1"/>
-            <a:r>
-              <a:rPr lang="en-US" dirty="0" err="1" smtClean="0"/>
-              <a:t>Mã</a:t>
-            </a:r>
-            <a:r>
-              <a:rPr lang="en-US" dirty="0" smtClean="0"/>
-              <a:t> </a:t>
-            </a:r>
-            <a:r>
-              <a:rPr lang="en-US" dirty="0" err="1" smtClean="0"/>
-              <a:t>mặt</a:t>
-            </a:r>
-            <a:r>
-              <a:rPr lang="en-US" dirty="0" smtClean="0"/>
-              <a:t> </a:t>
-            </a:r>
-            <a:r>
-              <a:rPr lang="en-US" dirty="0" err="1" smtClean="0"/>
-              <a:t>hàng</a:t>
-            </a:r>
-            <a:endParaRPr lang="en-US" dirty="0" smtClean="0"/>
-          </a:p>
-          <a:p>
-            <a:pPr lvl="1"/>
-            <a:r>
-              <a:rPr lang="en-US" dirty="0" err="1" smtClean="0"/>
-              <a:t>Giá</a:t>
-            </a:r>
-            <a:r>
-              <a:rPr lang="en-US" dirty="0" smtClean="0"/>
-              <a:t> </a:t>
-            </a:r>
-            <a:r>
-              <a:rPr lang="en-US" dirty="0" err="1" smtClean="0"/>
-              <a:t>nhập</a:t>
-            </a:r>
-            <a:endParaRPr lang="en-US" dirty="0" smtClean="0"/>
-          </a:p>
-          <a:p>
-            <a:pPr lvl="1"/>
-            <a:r>
-              <a:rPr lang="en-US" dirty="0" err="1" smtClean="0"/>
-              <a:t>Giá</a:t>
-            </a:r>
-            <a:r>
-              <a:rPr lang="en-US" dirty="0" smtClean="0"/>
-              <a:t> </a:t>
-            </a:r>
-            <a:r>
-              <a:rPr lang="en-US" dirty="0" err="1" smtClean="0"/>
-              <a:t>bán</a:t>
-            </a:r>
-            <a:endParaRPr lang="en-US" dirty="0" smtClean="0"/>
-          </a:p>
-          <a:p>
-            <a:pPr lvl="1"/>
-            <a:r>
-              <a:rPr lang="en-US" dirty="0" err="1" smtClean="0"/>
-              <a:t>Số</a:t>
-            </a:r>
-            <a:r>
-              <a:rPr lang="en-US" dirty="0" smtClean="0"/>
-              <a:t> </a:t>
-            </a:r>
-            <a:r>
-              <a:rPr lang="en-US" dirty="0" err="1" smtClean="0"/>
-              <a:t>lượng</a:t>
-            </a:r>
-            <a:r>
-              <a:rPr lang="en-US" dirty="0" smtClean="0"/>
-              <a:t> (</a:t>
-            </a:r>
-            <a:r>
-              <a:rPr lang="en-US" dirty="0" err="1" smtClean="0"/>
-              <a:t>có</a:t>
-            </a:r>
-            <a:r>
-              <a:rPr lang="en-US" dirty="0" smtClean="0"/>
-              <a:t> </a:t>
-            </a:r>
-            <a:r>
-              <a:rPr lang="en-US" dirty="0" err="1" smtClean="0"/>
-              <a:t>thể</a:t>
-            </a:r>
-            <a:r>
-              <a:rPr lang="en-US" dirty="0" smtClean="0"/>
-              <a:t> </a:t>
-            </a:r>
-            <a:r>
-              <a:rPr lang="en-US" dirty="0" err="1" smtClean="0"/>
-              <a:t>là</a:t>
-            </a:r>
-            <a:r>
-              <a:rPr lang="en-US" dirty="0" smtClean="0"/>
-              <a:t> 0)</a:t>
-            </a:r>
-          </a:p>
-          <a:p>
-            <a:pPr lvl="1"/>
-            <a:r>
-              <a:rPr lang="en-US" dirty="0" err="1" smtClean="0"/>
-              <a:t>Nhà</a:t>
-            </a:r>
-            <a:r>
-              <a:rPr lang="en-US" dirty="0" smtClean="0"/>
-              <a:t> </a:t>
-            </a:r>
-            <a:r>
-              <a:rPr lang="en-US" dirty="0" err="1" smtClean="0"/>
-              <a:t>sản</a:t>
-            </a:r>
-            <a:r>
-              <a:rPr lang="en-US" dirty="0" smtClean="0"/>
-              <a:t> </a:t>
-            </a:r>
-            <a:r>
-              <a:rPr lang="en-US" dirty="0" err="1" smtClean="0"/>
-              <a:t>xuất</a:t>
-            </a:r>
-            <a:endParaRPr lang="vi-VN" dirty="0"/>
-          </a:p>
-        </p:txBody>
-      </p:sp>
-      <p:sp>
-        <p:nvSpPr>
           <p:cNvPr id="4" name="Slide Number Placeholder 3"/>
           <p:cNvSpPr>
             <a:spLocks noGrp="1"/>
@@ -7714,10 +8455,114 @@
           </a:p>
         </p:txBody>
       </p:sp>
+      <p:pic>
+        <p:nvPicPr>
+          <p:cNvPr id="5" name="Picture 4"/>
+          <p:cNvPicPr/>
+          <p:nvPr/>
+        </p:nvPicPr>
+        <p:blipFill>
+          <a:blip r:embed="rId2">
+            <a:extLst>
+              <a:ext uri="{28A0092B-C50C-407E-A947-70E740481C1C}">
+                <a14:useLocalDpi xmlns:a14="http://schemas.microsoft.com/office/drawing/2010/main" val="0"/>
+              </a:ext>
+            </a:extLst>
+          </a:blip>
+          <a:srcRect/>
+          <a:stretch>
+            <a:fillRect/>
+          </a:stretch>
+        </p:blipFill>
+        <p:spPr bwMode="auto">
+          <a:xfrm>
+            <a:off x="971600" y="1268760"/>
+            <a:ext cx="7128792" cy="3456267"/>
+          </a:xfrm>
+          <a:prstGeom prst="rect">
+            <a:avLst/>
+          </a:prstGeom>
+          <a:noFill/>
+          <a:ln>
+            <a:noFill/>
+          </a:ln>
+        </p:spPr>
+      </p:pic>
+      <p:sp>
+        <p:nvSpPr>
+          <p:cNvPr id="8" name="TextBox 7"/>
+          <p:cNvSpPr txBox="1"/>
+          <p:nvPr/>
+        </p:nvSpPr>
+        <p:spPr>
+          <a:xfrm>
+            <a:off x="1259632" y="5143238"/>
+            <a:ext cx="6552728" cy="369332"/>
+          </a:xfrm>
+          <a:prstGeom prst="rect">
+            <a:avLst/>
+          </a:prstGeom>
+          <a:noFill/>
+        </p:spPr>
+        <p:txBody>
+          <a:bodyPr wrap="square" rtlCol="0">
+            <a:spAutoFit/>
+          </a:bodyPr>
+          <a:lstStyle/>
+          <a:p>
+            <a:pPr algn="ctr"/>
+            <a:r>
+              <a:rPr lang="en-US" dirty="0" err="1" smtClean="0"/>
+              <a:t>Hình</a:t>
+            </a:r>
+            <a:r>
+              <a:rPr lang="en-US" dirty="0" smtClean="0"/>
+              <a:t> 2.1:Chu </a:t>
+            </a:r>
+            <a:r>
+              <a:rPr lang="en-US" dirty="0" err="1" smtClean="0"/>
+              <a:t>trình</a:t>
+            </a:r>
+            <a:r>
+              <a:rPr lang="en-US" dirty="0" smtClean="0"/>
+              <a:t> </a:t>
+            </a:r>
+            <a:r>
+              <a:rPr lang="en-US" dirty="0" err="1" smtClean="0"/>
+              <a:t>xử</a:t>
+            </a:r>
+            <a:r>
+              <a:rPr lang="en-US" dirty="0" smtClean="0"/>
+              <a:t> </a:t>
+            </a:r>
+            <a:r>
+              <a:rPr lang="en-US" dirty="0" err="1" smtClean="0"/>
+              <a:t>lý</a:t>
+            </a:r>
+            <a:r>
+              <a:rPr lang="en-US" dirty="0" smtClean="0"/>
+              <a:t> </a:t>
+            </a:r>
+            <a:r>
+              <a:rPr lang="en-US" dirty="0" err="1" smtClean="0"/>
+              <a:t>hàng</a:t>
+            </a:r>
+            <a:r>
+              <a:rPr lang="en-US" dirty="0" smtClean="0"/>
+              <a:t> </a:t>
+            </a:r>
+            <a:r>
+              <a:rPr lang="en-US" dirty="0" err="1" smtClean="0"/>
+              <a:t>hóa</a:t>
+            </a:r>
+            <a:endParaRPr lang="en-US" dirty="0" smtClean="0"/>
+          </a:p>
+        </p:txBody>
+      </p:sp>
     </p:spTree>
     <p:extLst>
       <p:ext uri="{BB962C8B-B14F-4D97-AF65-F5344CB8AC3E}">
-        <p14:creationId xmlns:p14="http://schemas.microsoft.com/office/powerpoint/2010/main" val="1935174923"/>
+        <p14:creationId xmlns:p14="http://schemas.microsoft.com/office/powerpoint/2010/main" val="586407867"/>
       </p:ext>
     </p:extLst>
   </p:cSld>

</xml_diff>